<commit_message>
Tune figures for disputation
</commit_message>
<xml_diff>
--- a/figures/figures_eScience.pptx
+++ b/figures/figures_eScience.pptx
@@ -206,7 +206,7 @@
           </a:lstStyle>
           <a:p>
             <a:fld id="{B35BE548-DE05-8149-9395-93E03CC73C13}" type="datetimeFigureOut">
-              <a:t>06.04.23</a:t>
+              <a:t>14.06.23</a:t>
             </a:fld>
             <a:endParaRPr lang="de-DE"/>
           </a:p>
@@ -1458,7 +1458,7 @@
           <a:lstStyle/>
           <a:p>
             <a:fld id="{F7A3446A-3617-0E4A-A439-6DD0C73FFDE1}" type="datetimeFigureOut">
-              <a:t>06.04.23</a:t>
+              <a:t>14.06.23</a:t>
             </a:fld>
             <a:endParaRPr lang="de-DE"/>
           </a:p>
@@ -1654,7 +1654,7 @@
           <a:lstStyle/>
           <a:p>
             <a:fld id="{F7A3446A-3617-0E4A-A439-6DD0C73FFDE1}" type="datetimeFigureOut">
-              <a:t>06.04.23</a:t>
+              <a:t>14.06.23</a:t>
             </a:fld>
             <a:endParaRPr lang="de-DE"/>
           </a:p>
@@ -1860,7 +1860,7 @@
           <a:lstStyle/>
           <a:p>
             <a:fld id="{F7A3446A-3617-0E4A-A439-6DD0C73FFDE1}" type="datetimeFigureOut">
-              <a:t>06.04.23</a:t>
+              <a:t>14.06.23</a:t>
             </a:fld>
             <a:endParaRPr lang="de-DE"/>
           </a:p>
@@ -2056,7 +2056,7 @@
           <a:lstStyle/>
           <a:p>
             <a:fld id="{F7A3446A-3617-0E4A-A439-6DD0C73FFDE1}" type="datetimeFigureOut">
-              <a:t>06.04.23</a:t>
+              <a:t>14.06.23</a:t>
             </a:fld>
             <a:endParaRPr lang="de-DE"/>
           </a:p>
@@ -2329,7 +2329,7 @@
           <a:lstStyle/>
           <a:p>
             <a:fld id="{F7A3446A-3617-0E4A-A439-6DD0C73FFDE1}" type="datetimeFigureOut">
-              <a:t>06.04.23</a:t>
+              <a:t>14.06.23</a:t>
             </a:fld>
             <a:endParaRPr lang="de-DE"/>
           </a:p>
@@ -2592,7 +2592,7 @@
           <a:lstStyle/>
           <a:p>
             <a:fld id="{F7A3446A-3617-0E4A-A439-6DD0C73FFDE1}" type="datetimeFigureOut">
-              <a:t>06.04.23</a:t>
+              <a:t>14.06.23</a:t>
             </a:fld>
             <a:endParaRPr lang="de-DE"/>
           </a:p>
@@ -3002,7 +3002,7 @@
           <a:lstStyle/>
           <a:p>
             <a:fld id="{F7A3446A-3617-0E4A-A439-6DD0C73FFDE1}" type="datetimeFigureOut">
-              <a:t>06.04.23</a:t>
+              <a:t>14.06.23</a:t>
             </a:fld>
             <a:endParaRPr lang="de-DE"/>
           </a:p>
@@ -3141,7 +3141,7 @@
           <a:lstStyle/>
           <a:p>
             <a:fld id="{F7A3446A-3617-0E4A-A439-6DD0C73FFDE1}" type="datetimeFigureOut">
-              <a:t>06.04.23</a:t>
+              <a:t>14.06.23</a:t>
             </a:fld>
             <a:endParaRPr lang="de-DE"/>
           </a:p>
@@ -3252,7 +3252,7 @@
           <a:lstStyle/>
           <a:p>
             <a:fld id="{F7A3446A-3617-0E4A-A439-6DD0C73FFDE1}" type="datetimeFigureOut">
-              <a:t>06.04.23</a:t>
+              <a:t>14.06.23</a:t>
             </a:fld>
             <a:endParaRPr lang="de-DE"/>
           </a:p>
@@ -3561,7 +3561,7 @@
           <a:lstStyle/>
           <a:p>
             <a:fld id="{F7A3446A-3617-0E4A-A439-6DD0C73FFDE1}" type="datetimeFigureOut">
-              <a:t>06.04.23</a:t>
+              <a:t>14.06.23</a:t>
             </a:fld>
             <a:endParaRPr lang="de-DE"/>
           </a:p>
@@ -3847,7 +3847,7 @@
           <a:lstStyle/>
           <a:p>
             <a:fld id="{F7A3446A-3617-0E4A-A439-6DD0C73FFDE1}" type="datetimeFigureOut">
-              <a:t>06.04.23</a:t>
+              <a:t>14.06.23</a:t>
             </a:fld>
             <a:endParaRPr lang="de-DE"/>
           </a:p>
@@ -4086,7 +4086,7 @@
           </a:lstStyle>
           <a:p>
             <a:fld id="{F7A3446A-3617-0E4A-A439-6DD0C73FFDE1}" type="datetimeFigureOut">
-              <a:t>06.04.23</a:t>
+              <a:t>14.06.23</a:t>
             </a:fld>
             <a:endParaRPr lang="de-DE"/>
           </a:p>
@@ -9918,8 +9918,8 @@
           </p:txBody>
         </p:sp>
       </p:grpSp>
-      <mc:AlternateContent xmlns:mc="http://schemas.openxmlformats.org/markup-compatibility/2006">
-        <mc:Choice xmlns:a14="http://schemas.microsoft.com/office/drawing/2010/main" Requires="a14">
+      <mc:AlternateContent xmlns:mc="http://schemas.openxmlformats.org/markup-compatibility/2006" xmlns:a14="http://schemas.microsoft.com/office/drawing/2010/main">
+        <mc:Choice Requires="a14">
           <p:sp>
             <p:nvSpPr>
               <p:cNvPr id="4" name="Textfeld 3">
@@ -10023,7 +10023,7 @@
             </p:txBody>
           </p:sp>
         </mc:Choice>
-        <mc:Fallback>
+        <mc:Fallback xmlns="">
           <p:sp>
             <p:nvSpPr>
               <p:cNvPr id="4" name="Textfeld 3">
@@ -10068,8 +10068,8 @@
           </p:sp>
         </mc:Fallback>
       </mc:AlternateContent>
-      <mc:AlternateContent xmlns:mc="http://schemas.openxmlformats.org/markup-compatibility/2006">
-        <mc:Choice xmlns:a14="http://schemas.microsoft.com/office/drawing/2010/main" Requires="a14">
+      <mc:AlternateContent xmlns:mc="http://schemas.openxmlformats.org/markup-compatibility/2006" xmlns:a14="http://schemas.microsoft.com/office/drawing/2010/main">
+        <mc:Choice Requires="a14">
           <p:sp>
             <p:nvSpPr>
               <p:cNvPr id="5" name="Textfeld 4">
@@ -10260,7 +10260,7 @@
             </p:txBody>
           </p:sp>
         </mc:Choice>
-        <mc:Fallback>
+        <mc:Fallback xmlns="">
           <p:sp>
             <p:nvSpPr>
               <p:cNvPr id="5" name="Textfeld 4">
@@ -10305,8 +10305,8 @@
           </p:sp>
         </mc:Fallback>
       </mc:AlternateContent>
-      <mc:AlternateContent xmlns:mc="http://schemas.openxmlformats.org/markup-compatibility/2006">
-        <mc:Choice xmlns:a14="http://schemas.microsoft.com/office/drawing/2010/main" Requires="a14">
+      <mc:AlternateContent xmlns:mc="http://schemas.openxmlformats.org/markup-compatibility/2006" xmlns:a14="http://schemas.microsoft.com/office/drawing/2010/main">
+        <mc:Choice Requires="a14">
           <p:sp>
             <p:nvSpPr>
               <p:cNvPr id="7" name="Textfeld 6">
@@ -10497,7 +10497,7 @@
             </p:txBody>
           </p:sp>
         </mc:Choice>
-        <mc:Fallback>
+        <mc:Fallback xmlns="">
           <p:sp>
             <p:nvSpPr>
               <p:cNvPr id="7" name="Textfeld 6">
@@ -10542,8 +10542,8 @@
           </p:sp>
         </mc:Fallback>
       </mc:AlternateContent>
-      <mc:AlternateContent xmlns:mc="http://schemas.openxmlformats.org/markup-compatibility/2006">
-        <mc:Choice xmlns:a14="http://schemas.microsoft.com/office/drawing/2010/main" Requires="a14">
+      <mc:AlternateContent xmlns:mc="http://schemas.openxmlformats.org/markup-compatibility/2006" xmlns:a14="http://schemas.microsoft.com/office/drawing/2010/main">
+        <mc:Choice Requires="a14">
           <p:sp>
             <p:nvSpPr>
               <p:cNvPr id="45" name="Textfeld 44">
@@ -10734,7 +10734,7 @@
             </p:txBody>
           </p:sp>
         </mc:Choice>
-        <mc:Fallback>
+        <mc:Fallback xmlns="">
           <p:sp>
             <p:nvSpPr>
               <p:cNvPr id="45" name="Textfeld 44">
@@ -10779,8 +10779,8 @@
           </p:sp>
         </mc:Fallback>
       </mc:AlternateContent>
-      <mc:AlternateContent xmlns:mc="http://schemas.openxmlformats.org/markup-compatibility/2006">
-        <mc:Choice xmlns:a14="http://schemas.microsoft.com/office/drawing/2010/main" Requires="a14">
+      <mc:AlternateContent xmlns:mc="http://schemas.openxmlformats.org/markup-compatibility/2006" xmlns:a14="http://schemas.microsoft.com/office/drawing/2010/main">
+        <mc:Choice Requires="a14">
           <p:sp>
             <p:nvSpPr>
               <p:cNvPr id="54" name="Textfeld 53">
@@ -10849,7 +10849,7 @@
             </p:txBody>
           </p:sp>
         </mc:Choice>
-        <mc:Fallback>
+        <mc:Fallback xmlns="">
           <p:sp>
             <p:nvSpPr>
               <p:cNvPr id="54" name="Textfeld 53">
@@ -10894,8 +10894,8 @@
           </p:sp>
         </mc:Fallback>
       </mc:AlternateContent>
-      <mc:AlternateContent xmlns:mc="http://schemas.openxmlformats.org/markup-compatibility/2006">
-        <mc:Choice xmlns:a14="http://schemas.microsoft.com/office/drawing/2010/main" Requires="a14">
+      <mc:AlternateContent xmlns:mc="http://schemas.openxmlformats.org/markup-compatibility/2006" xmlns:a14="http://schemas.microsoft.com/office/drawing/2010/main">
+        <mc:Choice Requires="a14">
           <p:sp>
             <p:nvSpPr>
               <p:cNvPr id="61" name="Textfeld 60">
@@ -10964,7 +10964,7 @@
             </p:txBody>
           </p:sp>
         </mc:Choice>
-        <mc:Fallback>
+        <mc:Fallback xmlns="">
           <p:sp>
             <p:nvSpPr>
               <p:cNvPr id="61" name="Textfeld 60">
@@ -11009,8 +11009,8 @@
           </p:sp>
         </mc:Fallback>
       </mc:AlternateContent>
-      <mc:AlternateContent xmlns:mc="http://schemas.openxmlformats.org/markup-compatibility/2006">
-        <mc:Choice xmlns:a14="http://schemas.microsoft.com/office/drawing/2010/main" Requires="a14">
+      <mc:AlternateContent xmlns:mc="http://schemas.openxmlformats.org/markup-compatibility/2006" xmlns:a14="http://schemas.microsoft.com/office/drawing/2010/main">
+        <mc:Choice Requires="a14">
           <p:sp>
             <p:nvSpPr>
               <p:cNvPr id="62" name="Textfeld 61">
@@ -11079,7 +11079,7 @@
             </p:txBody>
           </p:sp>
         </mc:Choice>
-        <mc:Fallback>
+        <mc:Fallback xmlns="">
           <p:sp>
             <p:nvSpPr>
               <p:cNvPr id="62" name="Textfeld 61">
@@ -11124,8 +11124,8 @@
           </p:sp>
         </mc:Fallback>
       </mc:AlternateContent>
-      <mc:AlternateContent xmlns:mc="http://schemas.openxmlformats.org/markup-compatibility/2006">
-        <mc:Choice xmlns:a14="http://schemas.microsoft.com/office/drawing/2010/main" Requires="a14">
+      <mc:AlternateContent xmlns:mc="http://schemas.openxmlformats.org/markup-compatibility/2006" xmlns:a14="http://schemas.microsoft.com/office/drawing/2010/main">
+        <mc:Choice Requires="a14">
           <p:sp>
             <p:nvSpPr>
               <p:cNvPr id="67" name="Textfeld 66">
@@ -11194,7 +11194,7 @@
             </p:txBody>
           </p:sp>
         </mc:Choice>
-        <mc:Fallback>
+        <mc:Fallback xmlns="">
           <p:sp>
             <p:nvSpPr>
               <p:cNvPr id="67" name="Textfeld 66">
@@ -11239,8 +11239,8 @@
           </p:sp>
         </mc:Fallback>
       </mc:AlternateContent>
-      <mc:AlternateContent xmlns:mc="http://schemas.openxmlformats.org/markup-compatibility/2006">
-        <mc:Choice xmlns:a14="http://schemas.microsoft.com/office/drawing/2010/main" Requires="a14">
+      <mc:AlternateContent xmlns:mc="http://schemas.openxmlformats.org/markup-compatibility/2006" xmlns:a14="http://schemas.microsoft.com/office/drawing/2010/main">
+        <mc:Choice Requires="a14">
           <p:sp>
             <p:nvSpPr>
               <p:cNvPr id="69" name="Textfeld 68">
@@ -11340,7 +11340,7 @@
             </p:txBody>
           </p:sp>
         </mc:Choice>
-        <mc:Fallback>
+        <mc:Fallback xmlns="">
           <p:sp>
             <p:nvSpPr>
               <p:cNvPr id="69" name="Textfeld 68">
@@ -11385,8 +11385,8 @@
           </p:sp>
         </mc:Fallback>
       </mc:AlternateContent>
-      <mc:AlternateContent xmlns:mc="http://schemas.openxmlformats.org/markup-compatibility/2006">
-        <mc:Choice xmlns:a14="http://schemas.microsoft.com/office/drawing/2010/main" Requires="a14">
+      <mc:AlternateContent xmlns:mc="http://schemas.openxmlformats.org/markup-compatibility/2006" xmlns:a14="http://schemas.microsoft.com/office/drawing/2010/main">
+        <mc:Choice Requires="a14">
           <p:sp>
             <p:nvSpPr>
               <p:cNvPr id="78" name="Textfeld 77">
@@ -11455,7 +11455,7 @@
             </p:txBody>
           </p:sp>
         </mc:Choice>
-        <mc:Fallback>
+        <mc:Fallback xmlns="">
           <p:sp>
             <p:nvSpPr>
               <p:cNvPr id="78" name="Textfeld 77">
@@ -11500,8 +11500,8 @@
           </p:sp>
         </mc:Fallback>
       </mc:AlternateContent>
-      <mc:AlternateContent xmlns:mc="http://schemas.openxmlformats.org/markup-compatibility/2006">
-        <mc:Choice xmlns:a14="http://schemas.microsoft.com/office/drawing/2010/main" Requires="a14">
+      <mc:AlternateContent xmlns:mc="http://schemas.openxmlformats.org/markup-compatibility/2006" xmlns:a14="http://schemas.microsoft.com/office/drawing/2010/main">
+        <mc:Choice Requires="a14">
           <p:sp>
             <p:nvSpPr>
               <p:cNvPr id="80" name="Textfeld 79">
@@ -11601,7 +11601,7 @@
             </p:txBody>
           </p:sp>
         </mc:Choice>
-        <mc:Fallback>
+        <mc:Fallback xmlns="">
           <p:sp>
             <p:nvSpPr>
               <p:cNvPr id="80" name="Textfeld 79">
@@ -11646,8 +11646,8 @@
           </p:sp>
         </mc:Fallback>
       </mc:AlternateContent>
-      <mc:AlternateContent xmlns:mc="http://schemas.openxmlformats.org/markup-compatibility/2006">
-        <mc:Choice xmlns:a14="http://schemas.microsoft.com/office/drawing/2010/main" Requires="a14">
+      <mc:AlternateContent xmlns:mc="http://schemas.openxmlformats.org/markup-compatibility/2006" xmlns:a14="http://schemas.microsoft.com/office/drawing/2010/main">
+        <mc:Choice Requires="a14">
           <p:sp>
             <p:nvSpPr>
               <p:cNvPr id="81" name="Textfeld 80">
@@ -11716,7 +11716,7 @@
             </p:txBody>
           </p:sp>
         </mc:Choice>
-        <mc:Fallback>
+        <mc:Fallback xmlns="">
           <p:sp>
             <p:nvSpPr>
               <p:cNvPr id="81" name="Textfeld 80">
@@ -11761,8 +11761,8 @@
           </p:sp>
         </mc:Fallback>
       </mc:AlternateContent>
-      <mc:AlternateContent xmlns:mc="http://schemas.openxmlformats.org/markup-compatibility/2006">
-        <mc:Choice xmlns:a14="http://schemas.microsoft.com/office/drawing/2010/main" Requires="a14">
+      <mc:AlternateContent xmlns:mc="http://schemas.openxmlformats.org/markup-compatibility/2006" xmlns:a14="http://schemas.microsoft.com/office/drawing/2010/main">
+        <mc:Choice Requires="a14">
           <p:sp>
             <p:nvSpPr>
               <p:cNvPr id="82" name="Textfeld 81">
@@ -11862,7 +11862,7 @@
             </p:txBody>
           </p:sp>
         </mc:Choice>
-        <mc:Fallback>
+        <mc:Fallback xmlns="">
           <p:sp>
             <p:nvSpPr>
               <p:cNvPr id="82" name="Textfeld 81">
@@ -11907,8 +11907,8 @@
           </p:sp>
         </mc:Fallback>
       </mc:AlternateContent>
-      <mc:AlternateContent xmlns:mc="http://schemas.openxmlformats.org/markup-compatibility/2006">
-        <mc:Choice xmlns:a14="http://schemas.microsoft.com/office/drawing/2010/main" Requires="a14">
+      <mc:AlternateContent xmlns:mc="http://schemas.openxmlformats.org/markup-compatibility/2006" xmlns:a14="http://schemas.microsoft.com/office/drawing/2010/main">
+        <mc:Choice Requires="a14">
           <p:sp>
             <p:nvSpPr>
               <p:cNvPr id="83" name="Textfeld 82">
@@ -11977,7 +11977,7 @@
             </p:txBody>
           </p:sp>
         </mc:Choice>
-        <mc:Fallback>
+        <mc:Fallback xmlns="">
           <p:sp>
             <p:nvSpPr>
               <p:cNvPr id="83" name="Textfeld 82">
@@ -12178,8 +12178,8 @@
           </a:fontRef>
         </p:style>
       </p:cxnSp>
-      <mc:AlternateContent xmlns:mc="http://schemas.openxmlformats.org/markup-compatibility/2006">
-        <mc:Choice xmlns:a14="http://schemas.microsoft.com/office/drawing/2010/main" Requires="a14">
+      <mc:AlternateContent xmlns:mc="http://schemas.openxmlformats.org/markup-compatibility/2006" xmlns:a14="http://schemas.microsoft.com/office/drawing/2010/main">
+        <mc:Choice Requires="a14">
           <p:sp>
             <p:nvSpPr>
               <p:cNvPr id="89" name="Textfeld 88">
@@ -12248,7 +12248,7 @@
             </p:txBody>
           </p:sp>
         </mc:Choice>
-        <mc:Fallback>
+        <mc:Fallback xmlns="">
           <p:sp>
             <p:nvSpPr>
               <p:cNvPr id="89" name="Textfeld 88">
@@ -12293,8 +12293,8 @@
           </p:sp>
         </mc:Fallback>
       </mc:AlternateContent>
-      <mc:AlternateContent xmlns:mc="http://schemas.openxmlformats.org/markup-compatibility/2006">
-        <mc:Choice xmlns:a14="http://schemas.microsoft.com/office/drawing/2010/main" Requires="a14">
+      <mc:AlternateContent xmlns:mc="http://schemas.openxmlformats.org/markup-compatibility/2006" xmlns:a14="http://schemas.microsoft.com/office/drawing/2010/main">
+        <mc:Choice Requires="a14">
           <p:sp>
             <p:nvSpPr>
               <p:cNvPr id="90" name="Textfeld 89">
@@ -12363,7 +12363,7 @@
             </p:txBody>
           </p:sp>
         </mc:Choice>
-        <mc:Fallback>
+        <mc:Fallback xmlns="">
           <p:sp>
             <p:nvSpPr>
               <p:cNvPr id="90" name="Textfeld 89">
@@ -12408,8 +12408,8 @@
           </p:sp>
         </mc:Fallback>
       </mc:AlternateContent>
-      <mc:AlternateContent xmlns:mc="http://schemas.openxmlformats.org/markup-compatibility/2006">
-        <mc:Choice xmlns:a14="http://schemas.microsoft.com/office/drawing/2010/main" Requires="a14">
+      <mc:AlternateContent xmlns:mc="http://schemas.openxmlformats.org/markup-compatibility/2006" xmlns:a14="http://schemas.microsoft.com/office/drawing/2010/main">
+        <mc:Choice Requires="a14">
           <p:sp>
             <p:nvSpPr>
               <p:cNvPr id="91" name="Textfeld 90">
@@ -12478,7 +12478,7 @@
             </p:txBody>
           </p:sp>
         </mc:Choice>
-        <mc:Fallback>
+        <mc:Fallback xmlns="">
           <p:sp>
             <p:nvSpPr>
               <p:cNvPr id="91" name="Textfeld 90">
@@ -12523,8 +12523,8 @@
           </p:sp>
         </mc:Fallback>
       </mc:AlternateContent>
-      <mc:AlternateContent xmlns:mc="http://schemas.openxmlformats.org/markup-compatibility/2006">
-        <mc:Choice xmlns:a14="http://schemas.microsoft.com/office/drawing/2010/main" Requires="a14">
+      <mc:AlternateContent xmlns:mc="http://schemas.openxmlformats.org/markup-compatibility/2006" xmlns:a14="http://schemas.microsoft.com/office/drawing/2010/main">
+        <mc:Choice Requires="a14">
           <p:sp>
             <p:nvSpPr>
               <p:cNvPr id="92" name="Textfeld 91">
@@ -12593,7 +12593,7 @@
             </p:txBody>
           </p:sp>
         </mc:Choice>
-        <mc:Fallback>
+        <mc:Fallback xmlns="">
           <p:sp>
             <p:nvSpPr>
               <p:cNvPr id="92" name="Textfeld 91">

</xml_diff>

<commit_message>
Tune figures for disputation (#77)
</commit_message>
<xml_diff>
--- a/figures/figures_eScience.pptx
+++ b/figures/figures_eScience.pptx
@@ -206,7 +206,7 @@
           </a:lstStyle>
           <a:p>
             <a:fld id="{B35BE548-DE05-8149-9395-93E03CC73C13}" type="datetimeFigureOut">
-              <a:t>06.04.23</a:t>
+              <a:t>14.06.23</a:t>
             </a:fld>
             <a:endParaRPr lang="de-DE"/>
           </a:p>
@@ -1458,7 +1458,7 @@
           <a:lstStyle/>
           <a:p>
             <a:fld id="{F7A3446A-3617-0E4A-A439-6DD0C73FFDE1}" type="datetimeFigureOut">
-              <a:t>06.04.23</a:t>
+              <a:t>14.06.23</a:t>
             </a:fld>
             <a:endParaRPr lang="de-DE"/>
           </a:p>
@@ -1654,7 +1654,7 @@
           <a:lstStyle/>
           <a:p>
             <a:fld id="{F7A3446A-3617-0E4A-A439-6DD0C73FFDE1}" type="datetimeFigureOut">
-              <a:t>06.04.23</a:t>
+              <a:t>14.06.23</a:t>
             </a:fld>
             <a:endParaRPr lang="de-DE"/>
           </a:p>
@@ -1860,7 +1860,7 @@
           <a:lstStyle/>
           <a:p>
             <a:fld id="{F7A3446A-3617-0E4A-A439-6DD0C73FFDE1}" type="datetimeFigureOut">
-              <a:t>06.04.23</a:t>
+              <a:t>14.06.23</a:t>
             </a:fld>
             <a:endParaRPr lang="de-DE"/>
           </a:p>
@@ -2056,7 +2056,7 @@
           <a:lstStyle/>
           <a:p>
             <a:fld id="{F7A3446A-3617-0E4A-A439-6DD0C73FFDE1}" type="datetimeFigureOut">
-              <a:t>06.04.23</a:t>
+              <a:t>14.06.23</a:t>
             </a:fld>
             <a:endParaRPr lang="de-DE"/>
           </a:p>
@@ -2329,7 +2329,7 @@
           <a:lstStyle/>
           <a:p>
             <a:fld id="{F7A3446A-3617-0E4A-A439-6DD0C73FFDE1}" type="datetimeFigureOut">
-              <a:t>06.04.23</a:t>
+              <a:t>14.06.23</a:t>
             </a:fld>
             <a:endParaRPr lang="de-DE"/>
           </a:p>
@@ -2592,7 +2592,7 @@
           <a:lstStyle/>
           <a:p>
             <a:fld id="{F7A3446A-3617-0E4A-A439-6DD0C73FFDE1}" type="datetimeFigureOut">
-              <a:t>06.04.23</a:t>
+              <a:t>14.06.23</a:t>
             </a:fld>
             <a:endParaRPr lang="de-DE"/>
           </a:p>
@@ -3002,7 +3002,7 @@
           <a:lstStyle/>
           <a:p>
             <a:fld id="{F7A3446A-3617-0E4A-A439-6DD0C73FFDE1}" type="datetimeFigureOut">
-              <a:t>06.04.23</a:t>
+              <a:t>14.06.23</a:t>
             </a:fld>
             <a:endParaRPr lang="de-DE"/>
           </a:p>
@@ -3141,7 +3141,7 @@
           <a:lstStyle/>
           <a:p>
             <a:fld id="{F7A3446A-3617-0E4A-A439-6DD0C73FFDE1}" type="datetimeFigureOut">
-              <a:t>06.04.23</a:t>
+              <a:t>14.06.23</a:t>
             </a:fld>
             <a:endParaRPr lang="de-DE"/>
           </a:p>
@@ -3252,7 +3252,7 @@
           <a:lstStyle/>
           <a:p>
             <a:fld id="{F7A3446A-3617-0E4A-A439-6DD0C73FFDE1}" type="datetimeFigureOut">
-              <a:t>06.04.23</a:t>
+              <a:t>14.06.23</a:t>
             </a:fld>
             <a:endParaRPr lang="de-DE"/>
           </a:p>
@@ -3561,7 +3561,7 @@
           <a:lstStyle/>
           <a:p>
             <a:fld id="{F7A3446A-3617-0E4A-A439-6DD0C73FFDE1}" type="datetimeFigureOut">
-              <a:t>06.04.23</a:t>
+              <a:t>14.06.23</a:t>
             </a:fld>
             <a:endParaRPr lang="de-DE"/>
           </a:p>
@@ -3847,7 +3847,7 @@
           <a:lstStyle/>
           <a:p>
             <a:fld id="{F7A3446A-3617-0E4A-A439-6DD0C73FFDE1}" type="datetimeFigureOut">
-              <a:t>06.04.23</a:t>
+              <a:t>14.06.23</a:t>
             </a:fld>
             <a:endParaRPr lang="de-DE"/>
           </a:p>
@@ -4086,7 +4086,7 @@
           </a:lstStyle>
           <a:p>
             <a:fld id="{F7A3446A-3617-0E4A-A439-6DD0C73FFDE1}" type="datetimeFigureOut">
-              <a:t>06.04.23</a:t>
+              <a:t>14.06.23</a:t>
             </a:fld>
             <a:endParaRPr lang="de-DE"/>
           </a:p>
@@ -9918,8 +9918,8 @@
           </p:txBody>
         </p:sp>
       </p:grpSp>
-      <mc:AlternateContent xmlns:mc="http://schemas.openxmlformats.org/markup-compatibility/2006">
-        <mc:Choice xmlns:a14="http://schemas.microsoft.com/office/drawing/2010/main" Requires="a14">
+      <mc:AlternateContent xmlns:mc="http://schemas.openxmlformats.org/markup-compatibility/2006" xmlns:a14="http://schemas.microsoft.com/office/drawing/2010/main">
+        <mc:Choice Requires="a14">
           <p:sp>
             <p:nvSpPr>
               <p:cNvPr id="4" name="Textfeld 3">
@@ -10023,7 +10023,7 @@
             </p:txBody>
           </p:sp>
         </mc:Choice>
-        <mc:Fallback>
+        <mc:Fallback xmlns="">
           <p:sp>
             <p:nvSpPr>
               <p:cNvPr id="4" name="Textfeld 3">
@@ -10068,8 +10068,8 @@
           </p:sp>
         </mc:Fallback>
       </mc:AlternateContent>
-      <mc:AlternateContent xmlns:mc="http://schemas.openxmlformats.org/markup-compatibility/2006">
-        <mc:Choice xmlns:a14="http://schemas.microsoft.com/office/drawing/2010/main" Requires="a14">
+      <mc:AlternateContent xmlns:mc="http://schemas.openxmlformats.org/markup-compatibility/2006" xmlns:a14="http://schemas.microsoft.com/office/drawing/2010/main">
+        <mc:Choice Requires="a14">
           <p:sp>
             <p:nvSpPr>
               <p:cNvPr id="5" name="Textfeld 4">
@@ -10260,7 +10260,7 @@
             </p:txBody>
           </p:sp>
         </mc:Choice>
-        <mc:Fallback>
+        <mc:Fallback xmlns="">
           <p:sp>
             <p:nvSpPr>
               <p:cNvPr id="5" name="Textfeld 4">
@@ -10305,8 +10305,8 @@
           </p:sp>
         </mc:Fallback>
       </mc:AlternateContent>
-      <mc:AlternateContent xmlns:mc="http://schemas.openxmlformats.org/markup-compatibility/2006">
-        <mc:Choice xmlns:a14="http://schemas.microsoft.com/office/drawing/2010/main" Requires="a14">
+      <mc:AlternateContent xmlns:mc="http://schemas.openxmlformats.org/markup-compatibility/2006" xmlns:a14="http://schemas.microsoft.com/office/drawing/2010/main">
+        <mc:Choice Requires="a14">
           <p:sp>
             <p:nvSpPr>
               <p:cNvPr id="7" name="Textfeld 6">
@@ -10497,7 +10497,7 @@
             </p:txBody>
           </p:sp>
         </mc:Choice>
-        <mc:Fallback>
+        <mc:Fallback xmlns="">
           <p:sp>
             <p:nvSpPr>
               <p:cNvPr id="7" name="Textfeld 6">
@@ -10542,8 +10542,8 @@
           </p:sp>
         </mc:Fallback>
       </mc:AlternateContent>
-      <mc:AlternateContent xmlns:mc="http://schemas.openxmlformats.org/markup-compatibility/2006">
-        <mc:Choice xmlns:a14="http://schemas.microsoft.com/office/drawing/2010/main" Requires="a14">
+      <mc:AlternateContent xmlns:mc="http://schemas.openxmlformats.org/markup-compatibility/2006" xmlns:a14="http://schemas.microsoft.com/office/drawing/2010/main">
+        <mc:Choice Requires="a14">
           <p:sp>
             <p:nvSpPr>
               <p:cNvPr id="45" name="Textfeld 44">
@@ -10734,7 +10734,7 @@
             </p:txBody>
           </p:sp>
         </mc:Choice>
-        <mc:Fallback>
+        <mc:Fallback xmlns="">
           <p:sp>
             <p:nvSpPr>
               <p:cNvPr id="45" name="Textfeld 44">
@@ -10779,8 +10779,8 @@
           </p:sp>
         </mc:Fallback>
       </mc:AlternateContent>
-      <mc:AlternateContent xmlns:mc="http://schemas.openxmlformats.org/markup-compatibility/2006">
-        <mc:Choice xmlns:a14="http://schemas.microsoft.com/office/drawing/2010/main" Requires="a14">
+      <mc:AlternateContent xmlns:mc="http://schemas.openxmlformats.org/markup-compatibility/2006" xmlns:a14="http://schemas.microsoft.com/office/drawing/2010/main">
+        <mc:Choice Requires="a14">
           <p:sp>
             <p:nvSpPr>
               <p:cNvPr id="54" name="Textfeld 53">
@@ -10849,7 +10849,7 @@
             </p:txBody>
           </p:sp>
         </mc:Choice>
-        <mc:Fallback>
+        <mc:Fallback xmlns="">
           <p:sp>
             <p:nvSpPr>
               <p:cNvPr id="54" name="Textfeld 53">
@@ -10894,8 +10894,8 @@
           </p:sp>
         </mc:Fallback>
       </mc:AlternateContent>
-      <mc:AlternateContent xmlns:mc="http://schemas.openxmlformats.org/markup-compatibility/2006">
-        <mc:Choice xmlns:a14="http://schemas.microsoft.com/office/drawing/2010/main" Requires="a14">
+      <mc:AlternateContent xmlns:mc="http://schemas.openxmlformats.org/markup-compatibility/2006" xmlns:a14="http://schemas.microsoft.com/office/drawing/2010/main">
+        <mc:Choice Requires="a14">
           <p:sp>
             <p:nvSpPr>
               <p:cNvPr id="61" name="Textfeld 60">
@@ -10964,7 +10964,7 @@
             </p:txBody>
           </p:sp>
         </mc:Choice>
-        <mc:Fallback>
+        <mc:Fallback xmlns="">
           <p:sp>
             <p:nvSpPr>
               <p:cNvPr id="61" name="Textfeld 60">
@@ -11009,8 +11009,8 @@
           </p:sp>
         </mc:Fallback>
       </mc:AlternateContent>
-      <mc:AlternateContent xmlns:mc="http://schemas.openxmlformats.org/markup-compatibility/2006">
-        <mc:Choice xmlns:a14="http://schemas.microsoft.com/office/drawing/2010/main" Requires="a14">
+      <mc:AlternateContent xmlns:mc="http://schemas.openxmlformats.org/markup-compatibility/2006" xmlns:a14="http://schemas.microsoft.com/office/drawing/2010/main">
+        <mc:Choice Requires="a14">
           <p:sp>
             <p:nvSpPr>
               <p:cNvPr id="62" name="Textfeld 61">
@@ -11079,7 +11079,7 @@
             </p:txBody>
           </p:sp>
         </mc:Choice>
-        <mc:Fallback>
+        <mc:Fallback xmlns="">
           <p:sp>
             <p:nvSpPr>
               <p:cNvPr id="62" name="Textfeld 61">
@@ -11124,8 +11124,8 @@
           </p:sp>
         </mc:Fallback>
       </mc:AlternateContent>
-      <mc:AlternateContent xmlns:mc="http://schemas.openxmlformats.org/markup-compatibility/2006">
-        <mc:Choice xmlns:a14="http://schemas.microsoft.com/office/drawing/2010/main" Requires="a14">
+      <mc:AlternateContent xmlns:mc="http://schemas.openxmlformats.org/markup-compatibility/2006" xmlns:a14="http://schemas.microsoft.com/office/drawing/2010/main">
+        <mc:Choice Requires="a14">
           <p:sp>
             <p:nvSpPr>
               <p:cNvPr id="67" name="Textfeld 66">
@@ -11194,7 +11194,7 @@
             </p:txBody>
           </p:sp>
         </mc:Choice>
-        <mc:Fallback>
+        <mc:Fallback xmlns="">
           <p:sp>
             <p:nvSpPr>
               <p:cNvPr id="67" name="Textfeld 66">
@@ -11239,8 +11239,8 @@
           </p:sp>
         </mc:Fallback>
       </mc:AlternateContent>
-      <mc:AlternateContent xmlns:mc="http://schemas.openxmlformats.org/markup-compatibility/2006">
-        <mc:Choice xmlns:a14="http://schemas.microsoft.com/office/drawing/2010/main" Requires="a14">
+      <mc:AlternateContent xmlns:mc="http://schemas.openxmlformats.org/markup-compatibility/2006" xmlns:a14="http://schemas.microsoft.com/office/drawing/2010/main">
+        <mc:Choice Requires="a14">
           <p:sp>
             <p:nvSpPr>
               <p:cNvPr id="69" name="Textfeld 68">
@@ -11340,7 +11340,7 @@
             </p:txBody>
           </p:sp>
         </mc:Choice>
-        <mc:Fallback>
+        <mc:Fallback xmlns="">
           <p:sp>
             <p:nvSpPr>
               <p:cNvPr id="69" name="Textfeld 68">
@@ -11385,8 +11385,8 @@
           </p:sp>
         </mc:Fallback>
       </mc:AlternateContent>
-      <mc:AlternateContent xmlns:mc="http://schemas.openxmlformats.org/markup-compatibility/2006">
-        <mc:Choice xmlns:a14="http://schemas.microsoft.com/office/drawing/2010/main" Requires="a14">
+      <mc:AlternateContent xmlns:mc="http://schemas.openxmlformats.org/markup-compatibility/2006" xmlns:a14="http://schemas.microsoft.com/office/drawing/2010/main">
+        <mc:Choice Requires="a14">
           <p:sp>
             <p:nvSpPr>
               <p:cNvPr id="78" name="Textfeld 77">
@@ -11455,7 +11455,7 @@
             </p:txBody>
           </p:sp>
         </mc:Choice>
-        <mc:Fallback>
+        <mc:Fallback xmlns="">
           <p:sp>
             <p:nvSpPr>
               <p:cNvPr id="78" name="Textfeld 77">
@@ -11500,8 +11500,8 @@
           </p:sp>
         </mc:Fallback>
       </mc:AlternateContent>
-      <mc:AlternateContent xmlns:mc="http://schemas.openxmlformats.org/markup-compatibility/2006">
-        <mc:Choice xmlns:a14="http://schemas.microsoft.com/office/drawing/2010/main" Requires="a14">
+      <mc:AlternateContent xmlns:mc="http://schemas.openxmlformats.org/markup-compatibility/2006" xmlns:a14="http://schemas.microsoft.com/office/drawing/2010/main">
+        <mc:Choice Requires="a14">
           <p:sp>
             <p:nvSpPr>
               <p:cNvPr id="80" name="Textfeld 79">
@@ -11601,7 +11601,7 @@
             </p:txBody>
           </p:sp>
         </mc:Choice>
-        <mc:Fallback>
+        <mc:Fallback xmlns="">
           <p:sp>
             <p:nvSpPr>
               <p:cNvPr id="80" name="Textfeld 79">
@@ -11646,8 +11646,8 @@
           </p:sp>
         </mc:Fallback>
       </mc:AlternateContent>
-      <mc:AlternateContent xmlns:mc="http://schemas.openxmlformats.org/markup-compatibility/2006">
-        <mc:Choice xmlns:a14="http://schemas.microsoft.com/office/drawing/2010/main" Requires="a14">
+      <mc:AlternateContent xmlns:mc="http://schemas.openxmlformats.org/markup-compatibility/2006" xmlns:a14="http://schemas.microsoft.com/office/drawing/2010/main">
+        <mc:Choice Requires="a14">
           <p:sp>
             <p:nvSpPr>
               <p:cNvPr id="81" name="Textfeld 80">
@@ -11716,7 +11716,7 @@
             </p:txBody>
           </p:sp>
         </mc:Choice>
-        <mc:Fallback>
+        <mc:Fallback xmlns="">
           <p:sp>
             <p:nvSpPr>
               <p:cNvPr id="81" name="Textfeld 80">
@@ -11761,8 +11761,8 @@
           </p:sp>
         </mc:Fallback>
       </mc:AlternateContent>
-      <mc:AlternateContent xmlns:mc="http://schemas.openxmlformats.org/markup-compatibility/2006">
-        <mc:Choice xmlns:a14="http://schemas.microsoft.com/office/drawing/2010/main" Requires="a14">
+      <mc:AlternateContent xmlns:mc="http://schemas.openxmlformats.org/markup-compatibility/2006" xmlns:a14="http://schemas.microsoft.com/office/drawing/2010/main">
+        <mc:Choice Requires="a14">
           <p:sp>
             <p:nvSpPr>
               <p:cNvPr id="82" name="Textfeld 81">
@@ -11862,7 +11862,7 @@
             </p:txBody>
           </p:sp>
         </mc:Choice>
-        <mc:Fallback>
+        <mc:Fallback xmlns="">
           <p:sp>
             <p:nvSpPr>
               <p:cNvPr id="82" name="Textfeld 81">
@@ -11907,8 +11907,8 @@
           </p:sp>
         </mc:Fallback>
       </mc:AlternateContent>
-      <mc:AlternateContent xmlns:mc="http://schemas.openxmlformats.org/markup-compatibility/2006">
-        <mc:Choice xmlns:a14="http://schemas.microsoft.com/office/drawing/2010/main" Requires="a14">
+      <mc:AlternateContent xmlns:mc="http://schemas.openxmlformats.org/markup-compatibility/2006" xmlns:a14="http://schemas.microsoft.com/office/drawing/2010/main">
+        <mc:Choice Requires="a14">
           <p:sp>
             <p:nvSpPr>
               <p:cNvPr id="83" name="Textfeld 82">
@@ -11977,7 +11977,7 @@
             </p:txBody>
           </p:sp>
         </mc:Choice>
-        <mc:Fallback>
+        <mc:Fallback xmlns="">
           <p:sp>
             <p:nvSpPr>
               <p:cNvPr id="83" name="Textfeld 82">
@@ -12178,8 +12178,8 @@
           </a:fontRef>
         </p:style>
       </p:cxnSp>
-      <mc:AlternateContent xmlns:mc="http://schemas.openxmlformats.org/markup-compatibility/2006">
-        <mc:Choice xmlns:a14="http://schemas.microsoft.com/office/drawing/2010/main" Requires="a14">
+      <mc:AlternateContent xmlns:mc="http://schemas.openxmlformats.org/markup-compatibility/2006" xmlns:a14="http://schemas.microsoft.com/office/drawing/2010/main">
+        <mc:Choice Requires="a14">
           <p:sp>
             <p:nvSpPr>
               <p:cNvPr id="89" name="Textfeld 88">
@@ -12248,7 +12248,7 @@
             </p:txBody>
           </p:sp>
         </mc:Choice>
-        <mc:Fallback>
+        <mc:Fallback xmlns="">
           <p:sp>
             <p:nvSpPr>
               <p:cNvPr id="89" name="Textfeld 88">
@@ -12293,8 +12293,8 @@
           </p:sp>
         </mc:Fallback>
       </mc:AlternateContent>
-      <mc:AlternateContent xmlns:mc="http://schemas.openxmlformats.org/markup-compatibility/2006">
-        <mc:Choice xmlns:a14="http://schemas.microsoft.com/office/drawing/2010/main" Requires="a14">
+      <mc:AlternateContent xmlns:mc="http://schemas.openxmlformats.org/markup-compatibility/2006" xmlns:a14="http://schemas.microsoft.com/office/drawing/2010/main">
+        <mc:Choice Requires="a14">
           <p:sp>
             <p:nvSpPr>
               <p:cNvPr id="90" name="Textfeld 89">
@@ -12363,7 +12363,7 @@
             </p:txBody>
           </p:sp>
         </mc:Choice>
-        <mc:Fallback>
+        <mc:Fallback xmlns="">
           <p:sp>
             <p:nvSpPr>
               <p:cNvPr id="90" name="Textfeld 89">
@@ -12408,8 +12408,8 @@
           </p:sp>
         </mc:Fallback>
       </mc:AlternateContent>
-      <mc:AlternateContent xmlns:mc="http://schemas.openxmlformats.org/markup-compatibility/2006">
-        <mc:Choice xmlns:a14="http://schemas.microsoft.com/office/drawing/2010/main" Requires="a14">
+      <mc:AlternateContent xmlns:mc="http://schemas.openxmlformats.org/markup-compatibility/2006" xmlns:a14="http://schemas.microsoft.com/office/drawing/2010/main">
+        <mc:Choice Requires="a14">
           <p:sp>
             <p:nvSpPr>
               <p:cNvPr id="91" name="Textfeld 90">
@@ -12478,7 +12478,7 @@
             </p:txBody>
           </p:sp>
         </mc:Choice>
-        <mc:Fallback>
+        <mc:Fallback xmlns="">
           <p:sp>
             <p:nvSpPr>
               <p:cNvPr id="91" name="Textfeld 90">
@@ -12523,8 +12523,8 @@
           </p:sp>
         </mc:Fallback>
       </mc:AlternateContent>
-      <mc:AlternateContent xmlns:mc="http://schemas.openxmlformats.org/markup-compatibility/2006">
-        <mc:Choice xmlns:a14="http://schemas.microsoft.com/office/drawing/2010/main" Requires="a14">
+      <mc:AlternateContent xmlns:mc="http://schemas.openxmlformats.org/markup-compatibility/2006" xmlns:a14="http://schemas.microsoft.com/office/drawing/2010/main">
+        <mc:Choice Requires="a14">
           <p:sp>
             <p:nvSpPr>
               <p:cNvPr id="92" name="Textfeld 91">
@@ -12593,7 +12593,7 @@
             </p:txBody>
           </p:sp>
         </mc:Choice>
-        <mc:Fallback>
+        <mc:Fallback xmlns="">
           <p:sp>
             <p:nvSpPr>
               <p:cNvPr id="92" name="Textfeld 91">

</xml_diff>

<commit_message>
Fix color bar caption in figure
</commit_message>
<xml_diff>
--- a/figures/figures_eScience.pptx
+++ b/figures/figures_eScience.pptx
@@ -5,7 +5,7 @@
     <p:sldMasterId id="2147483648" r:id="rId1"/>
   </p:sldMasterIdLst>
   <p:notesMasterIdLst>
-    <p:notesMasterId r:id="rId13"/>
+    <p:notesMasterId r:id="rId14"/>
   </p:notesMasterIdLst>
   <p:sldIdLst>
     <p:sldId id="256" r:id="rId2"/>
@@ -19,6 +19,7 @@
     <p:sldId id="280" r:id="rId10"/>
     <p:sldId id="279" r:id="rId11"/>
     <p:sldId id="282" r:id="rId12"/>
+    <p:sldId id="284" r:id="rId13"/>
   </p:sldIdLst>
   <p:sldSz cx="12192000" cy="6858000"/>
   <p:notesSz cx="6858000" cy="9144000"/>
@@ -206,7 +207,7 @@
           </a:lstStyle>
           <a:p>
             <a:fld id="{B35BE548-DE05-8149-9395-93E03CC73C13}" type="datetimeFigureOut">
-              <a:t>14.06.23</a:t>
+              <a:t>04.10.23</a:t>
             </a:fld>
             <a:endParaRPr lang="de-DE"/>
           </a:p>
@@ -640,6 +641,90 @@
 </p:notes>
 </file>
 
+<file path=ppt/notesSlides/notesSlide11.xml><?xml version="1.0" encoding="utf-8"?>
+<p:notes xmlns:a="http://schemas.openxmlformats.org/drawingml/2006/main" xmlns:r="http://schemas.openxmlformats.org/officeDocument/2006/relationships" xmlns:p="http://schemas.openxmlformats.org/presentationml/2006/main">
+  <p:cSld>
+    <p:spTree>
+      <p:nvGrpSpPr>
+        <p:cNvPr id="1" name=""/>
+        <p:cNvGrpSpPr/>
+        <p:nvPr/>
+      </p:nvGrpSpPr>
+      <p:grpSpPr>
+        <a:xfrm>
+          <a:off x="0" y="0"/>
+          <a:ext cx="0" cy="0"/>
+          <a:chOff x="0" y="0"/>
+          <a:chExt cx="0" cy="0"/>
+        </a:xfrm>
+      </p:grpSpPr>
+      <p:sp>
+        <p:nvSpPr>
+          <p:cNvPr id="2" name="Folienbildplatzhalter 1"/>
+          <p:cNvSpPr>
+            <a:spLocks noGrp="1" noRot="1" noChangeAspect="1"/>
+          </p:cNvSpPr>
+          <p:nvPr>
+            <p:ph type="sldImg"/>
+          </p:nvPr>
+        </p:nvSpPr>
+        <p:spPr/>
+      </p:sp>
+      <p:sp>
+        <p:nvSpPr>
+          <p:cNvPr id="3" name="Notizenplatzhalter 2"/>
+          <p:cNvSpPr>
+            <a:spLocks noGrp="1"/>
+          </p:cNvSpPr>
+          <p:nvPr>
+            <p:ph type="body" idx="1"/>
+          </p:nvPr>
+        </p:nvSpPr>
+        <p:spPr/>
+        <p:txBody>
+          <a:bodyPr/>
+          <a:lstStyle/>
+          <a:p>
+            <a:endParaRPr lang="de-DE"/>
+          </a:p>
+        </p:txBody>
+      </p:sp>
+      <p:sp>
+        <p:nvSpPr>
+          <p:cNvPr id="4" name="Foliennummernplatzhalter 3"/>
+          <p:cNvSpPr>
+            <a:spLocks noGrp="1"/>
+          </p:cNvSpPr>
+          <p:nvPr>
+            <p:ph type="sldNum" sz="quarter" idx="5"/>
+          </p:nvPr>
+        </p:nvSpPr>
+        <p:spPr/>
+        <p:txBody>
+          <a:bodyPr/>
+          <a:lstStyle/>
+          <a:p>
+            <a:fld id="{8676B46A-5025-BA4D-A49D-5D1F5DB78F39}" type="slidenum">
+              <a:rPr lang="de-DE"/>
+              <a:t>12</a:t>
+            </a:fld>
+            <a:endParaRPr lang="de-DE"/>
+          </a:p>
+        </p:txBody>
+      </p:sp>
+    </p:spTree>
+    <p:extLst>
+      <p:ext uri="{BB962C8B-B14F-4D97-AF65-F5344CB8AC3E}">
+        <p14:creationId xmlns:p14="http://schemas.microsoft.com/office/powerpoint/2010/main" val="3014416448"/>
+      </p:ext>
+    </p:extLst>
+  </p:cSld>
+  <p:clrMapOvr>
+    <a:masterClrMapping/>
+  </p:clrMapOvr>
+</p:notes>
+</file>
+
 <file path=ppt/notesSlides/notesSlide2.xml><?xml version="1.0" encoding="utf-8"?>
 <p:notes xmlns:a="http://schemas.openxmlformats.org/drawingml/2006/main" xmlns:r="http://schemas.openxmlformats.org/officeDocument/2006/relationships" xmlns:p="http://schemas.openxmlformats.org/presentationml/2006/main">
   <p:cSld>
@@ -1458,7 +1543,7 @@
           <a:lstStyle/>
           <a:p>
             <a:fld id="{F7A3446A-3617-0E4A-A439-6DD0C73FFDE1}" type="datetimeFigureOut">
-              <a:t>14.06.23</a:t>
+              <a:t>04.10.23</a:t>
             </a:fld>
             <a:endParaRPr lang="de-DE"/>
           </a:p>
@@ -1654,7 +1739,7 @@
           <a:lstStyle/>
           <a:p>
             <a:fld id="{F7A3446A-3617-0E4A-A439-6DD0C73FFDE1}" type="datetimeFigureOut">
-              <a:t>14.06.23</a:t>
+              <a:t>04.10.23</a:t>
             </a:fld>
             <a:endParaRPr lang="de-DE"/>
           </a:p>
@@ -1860,7 +1945,7 @@
           <a:lstStyle/>
           <a:p>
             <a:fld id="{F7A3446A-3617-0E4A-A439-6DD0C73FFDE1}" type="datetimeFigureOut">
-              <a:t>14.06.23</a:t>
+              <a:t>04.10.23</a:t>
             </a:fld>
             <a:endParaRPr lang="de-DE"/>
           </a:p>
@@ -2056,7 +2141,7 @@
           <a:lstStyle/>
           <a:p>
             <a:fld id="{F7A3446A-3617-0E4A-A439-6DD0C73FFDE1}" type="datetimeFigureOut">
-              <a:t>14.06.23</a:t>
+              <a:t>04.10.23</a:t>
             </a:fld>
             <a:endParaRPr lang="de-DE"/>
           </a:p>
@@ -2329,7 +2414,7 @@
           <a:lstStyle/>
           <a:p>
             <a:fld id="{F7A3446A-3617-0E4A-A439-6DD0C73FFDE1}" type="datetimeFigureOut">
-              <a:t>14.06.23</a:t>
+              <a:t>04.10.23</a:t>
             </a:fld>
             <a:endParaRPr lang="de-DE"/>
           </a:p>
@@ -2592,7 +2677,7 @@
           <a:lstStyle/>
           <a:p>
             <a:fld id="{F7A3446A-3617-0E4A-A439-6DD0C73FFDE1}" type="datetimeFigureOut">
-              <a:t>14.06.23</a:t>
+              <a:t>04.10.23</a:t>
             </a:fld>
             <a:endParaRPr lang="de-DE"/>
           </a:p>
@@ -3002,7 +3087,7 @@
           <a:lstStyle/>
           <a:p>
             <a:fld id="{F7A3446A-3617-0E4A-A439-6DD0C73FFDE1}" type="datetimeFigureOut">
-              <a:t>14.06.23</a:t>
+              <a:t>04.10.23</a:t>
             </a:fld>
             <a:endParaRPr lang="de-DE"/>
           </a:p>
@@ -3141,7 +3226,7 @@
           <a:lstStyle/>
           <a:p>
             <a:fld id="{F7A3446A-3617-0E4A-A439-6DD0C73FFDE1}" type="datetimeFigureOut">
-              <a:t>14.06.23</a:t>
+              <a:t>04.10.23</a:t>
             </a:fld>
             <a:endParaRPr lang="de-DE"/>
           </a:p>
@@ -3252,7 +3337,7 @@
           <a:lstStyle/>
           <a:p>
             <a:fld id="{F7A3446A-3617-0E4A-A439-6DD0C73FFDE1}" type="datetimeFigureOut">
-              <a:t>14.06.23</a:t>
+              <a:t>04.10.23</a:t>
             </a:fld>
             <a:endParaRPr lang="de-DE"/>
           </a:p>
@@ -3561,7 +3646,7 @@
           <a:lstStyle/>
           <a:p>
             <a:fld id="{F7A3446A-3617-0E4A-A439-6DD0C73FFDE1}" type="datetimeFigureOut">
-              <a:t>14.06.23</a:t>
+              <a:t>04.10.23</a:t>
             </a:fld>
             <a:endParaRPr lang="de-DE"/>
           </a:p>
@@ -3847,7 +3932,7 @@
           <a:lstStyle/>
           <a:p>
             <a:fld id="{F7A3446A-3617-0E4A-A439-6DD0C73FFDE1}" type="datetimeFigureOut">
-              <a:t>14.06.23</a:t>
+              <a:t>04.10.23</a:t>
             </a:fld>
             <a:endParaRPr lang="de-DE"/>
           </a:p>
@@ -4086,7 +4171,7 @@
           </a:lstStyle>
           <a:p>
             <a:fld id="{F7A3446A-3617-0E4A-A439-6DD0C73FFDE1}" type="datetimeFigureOut">
-              <a:t>14.06.23</a:t>
+              <a:t>04.10.23</a:t>
             </a:fld>
             <a:endParaRPr lang="de-DE"/>
           </a:p>
@@ -5984,6 +6069,778 @@
     <p:extLst>
       <p:ext uri="{BB962C8B-B14F-4D97-AF65-F5344CB8AC3E}">
         <p14:creationId xmlns:p14="http://schemas.microsoft.com/office/powerpoint/2010/main" val="3227484714"/>
+      </p:ext>
+    </p:extLst>
+  </p:cSld>
+  <p:clrMapOvr>
+    <a:masterClrMapping/>
+  </p:clrMapOvr>
+</p:sld>
+</file>
+
+<file path=ppt/slides/slide12.xml><?xml version="1.0" encoding="utf-8"?>
+<p:sld xmlns:a="http://schemas.openxmlformats.org/drawingml/2006/main" xmlns:r="http://schemas.openxmlformats.org/officeDocument/2006/relationships" xmlns:p="http://schemas.openxmlformats.org/presentationml/2006/main">
+  <p:cSld>
+    <p:spTree>
+      <p:nvGrpSpPr>
+        <p:cNvPr id="1" name=""/>
+        <p:cNvGrpSpPr/>
+        <p:nvPr/>
+      </p:nvGrpSpPr>
+      <p:grpSpPr>
+        <a:xfrm>
+          <a:off x="0" y="0"/>
+          <a:ext cx="0" cy="0"/>
+          <a:chOff x="0" y="0"/>
+          <a:chExt cx="0" cy="0"/>
+        </a:xfrm>
+      </p:grpSpPr>
+      <p:pic>
+        <p:nvPicPr>
+          <p:cNvPr id="5" name="Grafik 4">
+            <a:extLst>
+              <a:ext uri="{FF2B5EF4-FFF2-40B4-BE49-F238E27FC236}">
+                <a16:creationId xmlns:a16="http://schemas.microsoft.com/office/drawing/2014/main" id="{7CB0C9F3-9194-2081-1CA3-5700AB15AB75}"/>
+              </a:ext>
+            </a:extLst>
+          </p:cNvPr>
+          <p:cNvPicPr>
+            <a:picLocks noChangeAspect="1"/>
+          </p:cNvPicPr>
+          <p:nvPr/>
+        </p:nvPicPr>
+        <p:blipFill>
+          <a:blip r:embed="rId3"/>
+          <a:stretch>
+            <a:fillRect/>
+          </a:stretch>
+        </p:blipFill>
+        <p:spPr>
+          <a:xfrm>
+            <a:off x="34958" y="1610946"/>
+            <a:ext cx="3137838" cy="1548000"/>
+          </a:xfrm>
+          <a:prstGeom prst="rect">
+            <a:avLst/>
+          </a:prstGeom>
+        </p:spPr>
+      </p:pic>
+      <p:pic>
+        <p:nvPicPr>
+          <p:cNvPr id="7" name="Grafik 6">
+            <a:extLst>
+              <a:ext uri="{FF2B5EF4-FFF2-40B4-BE49-F238E27FC236}">
+                <a16:creationId xmlns:a16="http://schemas.microsoft.com/office/drawing/2014/main" id="{6249975B-EC28-27DE-1689-E985EBF836D1}"/>
+              </a:ext>
+            </a:extLst>
+          </p:cNvPr>
+          <p:cNvPicPr>
+            <a:picLocks noChangeAspect="1"/>
+          </p:cNvPicPr>
+          <p:nvPr/>
+        </p:nvPicPr>
+        <p:blipFill>
+          <a:blip r:embed="rId4"/>
+          <a:stretch>
+            <a:fillRect/>
+          </a:stretch>
+        </p:blipFill>
+        <p:spPr>
+          <a:xfrm>
+            <a:off x="34958" y="3281788"/>
+            <a:ext cx="3137838" cy="1548000"/>
+          </a:xfrm>
+          <a:prstGeom prst="rect">
+            <a:avLst/>
+          </a:prstGeom>
+        </p:spPr>
+      </p:pic>
+      <p:pic>
+        <p:nvPicPr>
+          <p:cNvPr id="8" name="Grafik 7">
+            <a:extLst>
+              <a:ext uri="{FF2B5EF4-FFF2-40B4-BE49-F238E27FC236}">
+                <a16:creationId xmlns:a16="http://schemas.microsoft.com/office/drawing/2014/main" id="{174345FE-D6E1-E5BE-2102-A5BCDABD4394}"/>
+              </a:ext>
+            </a:extLst>
+          </p:cNvPr>
+          <p:cNvPicPr>
+            <a:picLocks noChangeAspect="1"/>
+          </p:cNvPicPr>
+          <p:nvPr/>
+        </p:nvPicPr>
+        <p:blipFill>
+          <a:blip r:embed="rId5"/>
+          <a:stretch>
+            <a:fillRect/>
+          </a:stretch>
+        </p:blipFill>
+        <p:spPr>
+          <a:xfrm>
+            <a:off x="38956" y="4952630"/>
+            <a:ext cx="3139200" cy="1841664"/>
+          </a:xfrm>
+          <a:prstGeom prst="rect">
+            <a:avLst/>
+          </a:prstGeom>
+        </p:spPr>
+      </p:pic>
+      <p:pic>
+        <p:nvPicPr>
+          <p:cNvPr id="9" name="Grafik 8">
+            <a:extLst>
+              <a:ext uri="{FF2B5EF4-FFF2-40B4-BE49-F238E27FC236}">
+                <a16:creationId xmlns:a16="http://schemas.microsoft.com/office/drawing/2014/main" id="{40C54A0B-35B3-8308-9B41-684F4885121A}"/>
+              </a:ext>
+            </a:extLst>
+          </p:cNvPr>
+          <p:cNvPicPr>
+            <a:picLocks noChangeAspect="1"/>
+          </p:cNvPicPr>
+          <p:nvPr/>
+        </p:nvPicPr>
+        <p:blipFill>
+          <a:blip r:embed="rId6"/>
+          <a:stretch>
+            <a:fillRect/>
+          </a:stretch>
+        </p:blipFill>
+        <p:spPr>
+          <a:xfrm>
+            <a:off x="3378491" y="1610946"/>
+            <a:ext cx="3387290" cy="1548000"/>
+          </a:xfrm>
+          <a:prstGeom prst="rect">
+            <a:avLst/>
+          </a:prstGeom>
+        </p:spPr>
+      </p:pic>
+      <p:pic>
+        <p:nvPicPr>
+          <p:cNvPr id="10" name="Grafik 9">
+            <a:extLst>
+              <a:ext uri="{FF2B5EF4-FFF2-40B4-BE49-F238E27FC236}">
+                <a16:creationId xmlns:a16="http://schemas.microsoft.com/office/drawing/2014/main" id="{8DB35598-ED93-7E35-201A-9FDACCAE2B13}"/>
+              </a:ext>
+            </a:extLst>
+          </p:cNvPr>
+          <p:cNvPicPr>
+            <a:picLocks noChangeAspect="1"/>
+          </p:cNvPicPr>
+          <p:nvPr/>
+        </p:nvPicPr>
+        <p:blipFill>
+          <a:blip r:embed="rId7"/>
+          <a:stretch>
+            <a:fillRect/>
+          </a:stretch>
+        </p:blipFill>
+        <p:spPr>
+          <a:xfrm>
+            <a:off x="3378491" y="3281788"/>
+            <a:ext cx="3387290" cy="1548000"/>
+          </a:xfrm>
+          <a:prstGeom prst="rect">
+            <a:avLst/>
+          </a:prstGeom>
+        </p:spPr>
+      </p:pic>
+      <p:pic>
+        <p:nvPicPr>
+          <p:cNvPr id="13" name="Grafik 12">
+            <a:extLst>
+              <a:ext uri="{FF2B5EF4-FFF2-40B4-BE49-F238E27FC236}">
+                <a16:creationId xmlns:a16="http://schemas.microsoft.com/office/drawing/2014/main" id="{736C017E-A1FA-C756-E235-C89F8CD39F3A}"/>
+              </a:ext>
+            </a:extLst>
+          </p:cNvPr>
+          <p:cNvPicPr>
+            <a:picLocks noChangeAspect="1"/>
+          </p:cNvPicPr>
+          <p:nvPr/>
+        </p:nvPicPr>
+        <p:blipFill>
+          <a:blip r:embed="rId8"/>
+          <a:stretch>
+            <a:fillRect/>
+          </a:stretch>
+        </p:blipFill>
+        <p:spPr>
+          <a:xfrm>
+            <a:off x="3384580" y="4952630"/>
+            <a:ext cx="3394800" cy="1818344"/>
+          </a:xfrm>
+          <a:prstGeom prst="rect">
+            <a:avLst/>
+          </a:prstGeom>
+        </p:spPr>
+      </p:pic>
+      <p:sp>
+        <p:nvSpPr>
+          <p:cNvPr id="11" name="Rechteck 10">
+            <a:extLst>
+              <a:ext uri="{FF2B5EF4-FFF2-40B4-BE49-F238E27FC236}">
+                <a16:creationId xmlns:a16="http://schemas.microsoft.com/office/drawing/2014/main" id="{44994101-61C3-742A-9066-8520EBDD30B5}"/>
+              </a:ext>
+            </a:extLst>
+          </p:cNvPr>
+          <p:cNvSpPr/>
+          <p:nvPr/>
+        </p:nvSpPr>
+        <p:spPr>
+          <a:xfrm>
+            <a:off x="2795862" y="1781126"/>
+            <a:ext cx="360000" cy="360000"/>
+          </a:xfrm>
+          <a:prstGeom prst="rect">
+            <a:avLst/>
+          </a:prstGeom>
+          <a:solidFill>
+            <a:schemeClr val="bg2"/>
+          </a:solidFill>
+          <a:ln>
+            <a:noFill/>
+          </a:ln>
+        </p:spPr>
+        <p:style>
+          <a:lnRef idx="2">
+            <a:schemeClr val="accent1">
+              <a:shade val="50000"/>
+            </a:schemeClr>
+          </a:lnRef>
+          <a:fillRef idx="1">
+            <a:schemeClr val="accent1"/>
+          </a:fillRef>
+          <a:effectRef idx="0">
+            <a:schemeClr val="accent1"/>
+          </a:effectRef>
+          <a:fontRef idx="minor">
+            <a:schemeClr val="lt1"/>
+          </a:fontRef>
+        </p:style>
+        <p:txBody>
+          <a:bodyPr rtlCol="0" anchor="ctr"/>
+          <a:lstStyle/>
+          <a:p>
+            <a:pPr algn="ctr"/>
+            <a:r>
+              <a:rPr lang="de-DE" sz="2000" b="1">
+                <a:solidFill>
+                  <a:schemeClr val="tx1"/>
+                </a:solidFill>
+              </a:rPr>
+              <a:t>B</a:t>
+            </a:r>
+          </a:p>
+        </p:txBody>
+      </p:sp>
+      <p:sp>
+        <p:nvSpPr>
+          <p:cNvPr id="12" name="Rechteck 11">
+            <a:extLst>
+              <a:ext uri="{FF2B5EF4-FFF2-40B4-BE49-F238E27FC236}">
+                <a16:creationId xmlns:a16="http://schemas.microsoft.com/office/drawing/2014/main" id="{0EA071AE-534C-12DB-7B78-253852C24C6C}"/>
+              </a:ext>
+            </a:extLst>
+          </p:cNvPr>
+          <p:cNvSpPr/>
+          <p:nvPr/>
+        </p:nvSpPr>
+        <p:spPr>
+          <a:xfrm>
+            <a:off x="5747237" y="1773336"/>
+            <a:ext cx="360000" cy="360000"/>
+          </a:xfrm>
+          <a:prstGeom prst="rect">
+            <a:avLst/>
+          </a:prstGeom>
+          <a:solidFill>
+            <a:schemeClr val="bg2"/>
+          </a:solidFill>
+          <a:ln>
+            <a:noFill/>
+          </a:ln>
+        </p:spPr>
+        <p:style>
+          <a:lnRef idx="2">
+            <a:schemeClr val="accent1">
+              <a:shade val="50000"/>
+            </a:schemeClr>
+          </a:lnRef>
+          <a:fillRef idx="1">
+            <a:schemeClr val="accent1"/>
+          </a:fillRef>
+          <a:effectRef idx="0">
+            <a:schemeClr val="accent1"/>
+          </a:effectRef>
+          <a:fontRef idx="minor">
+            <a:schemeClr val="lt1"/>
+          </a:fontRef>
+        </p:style>
+        <p:txBody>
+          <a:bodyPr rtlCol="0" anchor="ctr"/>
+          <a:lstStyle/>
+          <a:p>
+            <a:pPr algn="ctr"/>
+            <a:r>
+              <a:rPr lang="de-DE" sz="2000" b="1">
+                <a:solidFill>
+                  <a:schemeClr val="tx1"/>
+                </a:solidFill>
+              </a:rPr>
+              <a:t>C</a:t>
+            </a:r>
+          </a:p>
+        </p:txBody>
+      </p:sp>
+      <p:sp>
+        <p:nvSpPr>
+          <p:cNvPr id="14" name="Rechteck 13">
+            <a:extLst>
+              <a:ext uri="{FF2B5EF4-FFF2-40B4-BE49-F238E27FC236}">
+                <a16:creationId xmlns:a16="http://schemas.microsoft.com/office/drawing/2014/main" id="{A2A80FEA-9EFE-3462-06E6-AEBEE3DFDC9E}"/>
+              </a:ext>
+            </a:extLst>
+          </p:cNvPr>
+          <p:cNvSpPr/>
+          <p:nvPr/>
+        </p:nvSpPr>
+        <p:spPr>
+          <a:xfrm>
+            <a:off x="2787394" y="3444260"/>
+            <a:ext cx="360000" cy="360000"/>
+          </a:xfrm>
+          <a:prstGeom prst="rect">
+            <a:avLst/>
+          </a:prstGeom>
+          <a:solidFill>
+            <a:schemeClr val="bg2"/>
+          </a:solidFill>
+          <a:ln>
+            <a:noFill/>
+          </a:ln>
+        </p:spPr>
+        <p:style>
+          <a:lnRef idx="2">
+            <a:schemeClr val="accent1">
+              <a:shade val="50000"/>
+            </a:schemeClr>
+          </a:lnRef>
+          <a:fillRef idx="1">
+            <a:schemeClr val="accent1"/>
+          </a:fillRef>
+          <a:effectRef idx="0">
+            <a:schemeClr val="accent1"/>
+          </a:effectRef>
+          <a:fontRef idx="minor">
+            <a:schemeClr val="lt1"/>
+          </a:fontRef>
+        </p:style>
+        <p:txBody>
+          <a:bodyPr rtlCol="0" anchor="ctr"/>
+          <a:lstStyle/>
+          <a:p>
+            <a:pPr algn="ctr"/>
+            <a:r>
+              <a:rPr lang="de-DE" sz="2000" b="1">
+                <a:solidFill>
+                  <a:schemeClr val="tx1"/>
+                </a:solidFill>
+              </a:rPr>
+              <a:t>D</a:t>
+            </a:r>
+          </a:p>
+        </p:txBody>
+      </p:sp>
+      <p:sp>
+        <p:nvSpPr>
+          <p:cNvPr id="15" name="Rechteck 14">
+            <a:extLst>
+              <a:ext uri="{FF2B5EF4-FFF2-40B4-BE49-F238E27FC236}">
+                <a16:creationId xmlns:a16="http://schemas.microsoft.com/office/drawing/2014/main" id="{8BA8B8E6-748E-F164-89E4-A239FCC0E026}"/>
+              </a:ext>
+            </a:extLst>
+          </p:cNvPr>
+          <p:cNvSpPr/>
+          <p:nvPr/>
+        </p:nvSpPr>
+        <p:spPr>
+          <a:xfrm>
+            <a:off x="5745053" y="3444264"/>
+            <a:ext cx="360000" cy="360000"/>
+          </a:xfrm>
+          <a:prstGeom prst="rect">
+            <a:avLst/>
+          </a:prstGeom>
+          <a:solidFill>
+            <a:schemeClr val="bg2"/>
+          </a:solidFill>
+          <a:ln>
+            <a:noFill/>
+          </a:ln>
+        </p:spPr>
+        <p:style>
+          <a:lnRef idx="2">
+            <a:schemeClr val="accent1">
+              <a:shade val="50000"/>
+            </a:schemeClr>
+          </a:lnRef>
+          <a:fillRef idx="1">
+            <a:schemeClr val="accent1"/>
+          </a:fillRef>
+          <a:effectRef idx="0">
+            <a:schemeClr val="accent1"/>
+          </a:effectRef>
+          <a:fontRef idx="minor">
+            <a:schemeClr val="lt1"/>
+          </a:fontRef>
+        </p:style>
+        <p:txBody>
+          <a:bodyPr rtlCol="0" anchor="ctr"/>
+          <a:lstStyle/>
+          <a:p>
+            <a:pPr algn="ctr"/>
+            <a:r>
+              <a:rPr lang="de-DE" sz="2000" b="1">
+                <a:solidFill>
+                  <a:schemeClr val="tx1"/>
+                </a:solidFill>
+              </a:rPr>
+              <a:t>E</a:t>
+            </a:r>
+          </a:p>
+        </p:txBody>
+      </p:sp>
+      <p:sp>
+        <p:nvSpPr>
+          <p:cNvPr id="16" name="Rechteck 15">
+            <a:extLst>
+              <a:ext uri="{FF2B5EF4-FFF2-40B4-BE49-F238E27FC236}">
+                <a16:creationId xmlns:a16="http://schemas.microsoft.com/office/drawing/2014/main" id="{F96BAF00-E597-4C76-109E-3AE21C9AECF0}"/>
+              </a:ext>
+            </a:extLst>
+          </p:cNvPr>
+          <p:cNvSpPr/>
+          <p:nvPr/>
+        </p:nvSpPr>
+        <p:spPr>
+          <a:xfrm>
+            <a:off x="2787395" y="5110110"/>
+            <a:ext cx="360000" cy="360000"/>
+          </a:xfrm>
+          <a:prstGeom prst="rect">
+            <a:avLst/>
+          </a:prstGeom>
+          <a:solidFill>
+            <a:schemeClr val="bg2"/>
+          </a:solidFill>
+          <a:ln>
+            <a:noFill/>
+          </a:ln>
+        </p:spPr>
+        <p:style>
+          <a:lnRef idx="2">
+            <a:schemeClr val="accent1">
+              <a:shade val="50000"/>
+            </a:schemeClr>
+          </a:lnRef>
+          <a:fillRef idx="1">
+            <a:schemeClr val="accent1"/>
+          </a:fillRef>
+          <a:effectRef idx="0">
+            <a:schemeClr val="accent1"/>
+          </a:effectRef>
+          <a:fontRef idx="minor">
+            <a:schemeClr val="lt1"/>
+          </a:fontRef>
+        </p:style>
+        <p:txBody>
+          <a:bodyPr rtlCol="0" anchor="ctr"/>
+          <a:lstStyle/>
+          <a:p>
+            <a:pPr algn="ctr"/>
+            <a:r>
+              <a:rPr lang="de-DE" sz="2000" b="1">
+                <a:solidFill>
+                  <a:schemeClr val="tx1"/>
+                </a:solidFill>
+              </a:rPr>
+              <a:t>F</a:t>
+            </a:r>
+          </a:p>
+        </p:txBody>
+      </p:sp>
+      <p:sp>
+        <p:nvSpPr>
+          <p:cNvPr id="17" name="Rechteck 16">
+            <a:extLst>
+              <a:ext uri="{FF2B5EF4-FFF2-40B4-BE49-F238E27FC236}">
+                <a16:creationId xmlns:a16="http://schemas.microsoft.com/office/drawing/2014/main" id="{CF260528-65C8-1781-3362-195903686F4B}"/>
+              </a:ext>
+            </a:extLst>
+          </p:cNvPr>
+          <p:cNvSpPr/>
+          <p:nvPr/>
+        </p:nvSpPr>
+        <p:spPr>
+          <a:xfrm>
+            <a:off x="5770453" y="5101644"/>
+            <a:ext cx="360000" cy="360000"/>
+          </a:xfrm>
+          <a:prstGeom prst="rect">
+            <a:avLst/>
+          </a:prstGeom>
+          <a:solidFill>
+            <a:schemeClr val="bg2"/>
+          </a:solidFill>
+          <a:ln>
+            <a:noFill/>
+          </a:ln>
+        </p:spPr>
+        <p:style>
+          <a:lnRef idx="2">
+            <a:schemeClr val="accent1">
+              <a:shade val="50000"/>
+            </a:schemeClr>
+          </a:lnRef>
+          <a:fillRef idx="1">
+            <a:schemeClr val="accent1"/>
+          </a:fillRef>
+          <a:effectRef idx="0">
+            <a:schemeClr val="accent1"/>
+          </a:effectRef>
+          <a:fontRef idx="minor">
+            <a:schemeClr val="lt1"/>
+          </a:fontRef>
+        </p:style>
+        <p:txBody>
+          <a:bodyPr rtlCol="0" anchor="ctr"/>
+          <a:lstStyle/>
+          <a:p>
+            <a:pPr algn="ctr"/>
+            <a:r>
+              <a:rPr lang="de-DE" sz="2000" b="1">
+                <a:solidFill>
+                  <a:schemeClr val="tx1"/>
+                </a:solidFill>
+              </a:rPr>
+              <a:t>G</a:t>
+            </a:r>
+          </a:p>
+        </p:txBody>
+      </p:sp>
+      <p:cxnSp>
+        <p:nvCxnSpPr>
+          <p:cNvPr id="20" name="Gerade Verbindung 19">
+            <a:extLst>
+              <a:ext uri="{FF2B5EF4-FFF2-40B4-BE49-F238E27FC236}">
+                <a16:creationId xmlns:a16="http://schemas.microsoft.com/office/drawing/2014/main" id="{4CDE1E87-D42B-90A6-E8A5-5B3D0E804E83}"/>
+              </a:ext>
+            </a:extLst>
+          </p:cNvPr>
+          <p:cNvCxnSpPr>
+            <a:cxnSpLocks/>
+          </p:cNvCxnSpPr>
+          <p:nvPr/>
+        </p:nvCxnSpPr>
+        <p:spPr>
+          <a:xfrm flipV="1">
+            <a:off x="3284110" y="1649073"/>
+            <a:ext cx="0" cy="4696061"/>
+          </a:xfrm>
+          <a:prstGeom prst="line">
+            <a:avLst/>
+          </a:prstGeom>
+          <a:ln w="12700">
+            <a:solidFill>
+              <a:schemeClr val="tx1"/>
+            </a:solidFill>
+            <a:prstDash val="dash"/>
+          </a:ln>
+        </p:spPr>
+        <p:style>
+          <a:lnRef idx="1">
+            <a:schemeClr val="accent1"/>
+          </a:lnRef>
+          <a:fillRef idx="0">
+            <a:schemeClr val="accent1"/>
+          </a:fillRef>
+          <a:effectRef idx="0">
+            <a:schemeClr val="accent1"/>
+          </a:effectRef>
+          <a:fontRef idx="minor">
+            <a:schemeClr val="tx1"/>
+          </a:fontRef>
+        </p:style>
+      </p:cxnSp>
+      <p:pic>
+        <p:nvPicPr>
+          <p:cNvPr id="30" name="Grafik 29">
+            <a:extLst>
+              <a:ext uri="{FF2B5EF4-FFF2-40B4-BE49-F238E27FC236}">
+                <a16:creationId xmlns:a16="http://schemas.microsoft.com/office/drawing/2014/main" id="{22D09A14-24E5-F7B8-24A6-686695A2B38C}"/>
+              </a:ext>
+            </a:extLst>
+          </p:cNvPr>
+          <p:cNvPicPr>
+            <a:picLocks noChangeAspect="1"/>
+          </p:cNvPicPr>
+          <p:nvPr/>
+        </p:nvPicPr>
+        <p:blipFill>
+          <a:blip r:embed="rId9"/>
+          <a:stretch>
+            <a:fillRect/>
+          </a:stretch>
+        </p:blipFill>
+        <p:spPr>
+          <a:xfrm>
+            <a:off x="1513923" y="8760"/>
+            <a:ext cx="3758248" cy="1548000"/>
+          </a:xfrm>
+          <a:prstGeom prst="rect">
+            <a:avLst/>
+          </a:prstGeom>
+        </p:spPr>
+      </p:pic>
+      <p:sp>
+        <p:nvSpPr>
+          <p:cNvPr id="6" name="Rechteck 5">
+            <a:extLst>
+              <a:ext uri="{FF2B5EF4-FFF2-40B4-BE49-F238E27FC236}">
+                <a16:creationId xmlns:a16="http://schemas.microsoft.com/office/drawing/2014/main" id="{E2248A96-BA01-9896-8B41-21A2BBC33101}"/>
+              </a:ext>
+            </a:extLst>
+          </p:cNvPr>
+          <p:cNvSpPr/>
+          <p:nvPr/>
+        </p:nvSpPr>
+        <p:spPr>
+          <a:xfrm>
+            <a:off x="4246493" y="172163"/>
+            <a:ext cx="360000" cy="360000"/>
+          </a:xfrm>
+          <a:prstGeom prst="rect">
+            <a:avLst/>
+          </a:prstGeom>
+          <a:solidFill>
+            <a:schemeClr val="bg2"/>
+          </a:solidFill>
+          <a:ln>
+            <a:noFill/>
+          </a:ln>
+        </p:spPr>
+        <p:style>
+          <a:lnRef idx="2">
+            <a:schemeClr val="accent1">
+              <a:shade val="50000"/>
+            </a:schemeClr>
+          </a:lnRef>
+          <a:fillRef idx="1">
+            <a:schemeClr val="accent1"/>
+          </a:fillRef>
+          <a:effectRef idx="0">
+            <a:schemeClr val="accent1"/>
+          </a:effectRef>
+          <a:fontRef idx="minor">
+            <a:schemeClr val="lt1"/>
+          </a:fontRef>
+        </p:style>
+        <p:txBody>
+          <a:bodyPr rtlCol="0" anchor="ctr"/>
+          <a:lstStyle/>
+          <a:p>
+            <a:pPr algn="ctr"/>
+            <a:r>
+              <a:rPr lang="de-DE" sz="2000" b="1">
+                <a:solidFill>
+                  <a:schemeClr val="tx1"/>
+                </a:solidFill>
+              </a:rPr>
+              <a:t>A</a:t>
+            </a:r>
+          </a:p>
+        </p:txBody>
+      </p:sp>
+      <p:pic>
+        <p:nvPicPr>
+          <p:cNvPr id="2" name="Grafik 1">
+            <a:extLst>
+              <a:ext uri="{FF2B5EF4-FFF2-40B4-BE49-F238E27FC236}">
+                <a16:creationId xmlns:a16="http://schemas.microsoft.com/office/drawing/2014/main" id="{898D025C-D70B-6394-03E5-EAC9E5236AC0}"/>
+              </a:ext>
+            </a:extLst>
+          </p:cNvPr>
+          <p:cNvPicPr>
+            <a:picLocks noChangeAspect="1"/>
+          </p:cNvPicPr>
+          <p:nvPr/>
+        </p:nvPicPr>
+        <p:blipFill>
+          <a:blip r:embed="rId10"/>
+          <a:stretch>
+            <a:fillRect/>
+          </a:stretch>
+        </p:blipFill>
+        <p:spPr>
+          <a:xfrm>
+            <a:off x="5132663" y="206834"/>
+            <a:ext cx="157895" cy="1238878"/>
+          </a:xfrm>
+          <a:prstGeom prst="rect">
+            <a:avLst/>
+          </a:prstGeom>
+        </p:spPr>
+      </p:pic>
+      <p:sp>
+        <p:nvSpPr>
+          <p:cNvPr id="3" name="Textfeld 2">
+            <a:extLst>
+              <a:ext uri="{FF2B5EF4-FFF2-40B4-BE49-F238E27FC236}">
+                <a16:creationId xmlns:a16="http://schemas.microsoft.com/office/drawing/2014/main" id="{6EB48ED0-D4D7-2047-78BE-3BD56210E3B4}"/>
+              </a:ext>
+            </a:extLst>
+          </p:cNvPr>
+          <p:cNvSpPr txBox="1"/>
+          <p:nvPr/>
+        </p:nvSpPr>
+        <p:spPr>
+          <a:xfrm>
+            <a:off x="7489402" y="727656"/>
+            <a:ext cx="2839792" cy="369332"/>
+          </a:xfrm>
+          <a:prstGeom prst="rect">
+            <a:avLst/>
+          </a:prstGeom>
+          <a:noFill/>
+        </p:spPr>
+        <p:txBody>
+          <a:bodyPr wrap="square" rtlCol="0">
+            <a:spAutoFit/>
+          </a:bodyPr>
+          <a:lstStyle/>
+          <a:p>
+            <a:r>
+              <a:rPr lang="de-DE">
+                <a:solidFill>
+                  <a:srgbClr val="FF0000"/>
+                </a:solidFill>
+                <a:sym typeface="Wingdings" pitchFamily="2" charset="2"/>
+              </a:rPr>
+              <a:t> correct caption</a:t>
+            </a:r>
+            <a:endParaRPr lang="de-DE">
+              <a:solidFill>
+                <a:srgbClr val="FF0000"/>
+              </a:solidFill>
+            </a:endParaRPr>
+          </a:p>
+        </p:txBody>
+      </p:sp>
+    </p:spTree>
+    <p:extLst>
+      <p:ext uri="{BB962C8B-B14F-4D97-AF65-F5344CB8AC3E}">
+        <p14:creationId xmlns:p14="http://schemas.microsoft.com/office/powerpoint/2010/main" val="1441114311"/>
       </p:ext>
     </p:extLst>
   </p:cSld>

</xml_diff>

<commit_message>
Fix color bar caption in figure (#89)
</commit_message>
<xml_diff>
--- a/figures/figures_eScience.pptx
+++ b/figures/figures_eScience.pptx
@@ -5,7 +5,7 @@
     <p:sldMasterId id="2147483648" r:id="rId1"/>
   </p:sldMasterIdLst>
   <p:notesMasterIdLst>
-    <p:notesMasterId r:id="rId13"/>
+    <p:notesMasterId r:id="rId14"/>
   </p:notesMasterIdLst>
   <p:sldIdLst>
     <p:sldId id="256" r:id="rId2"/>
@@ -19,6 +19,7 @@
     <p:sldId id="280" r:id="rId10"/>
     <p:sldId id="279" r:id="rId11"/>
     <p:sldId id="282" r:id="rId12"/>
+    <p:sldId id="284" r:id="rId13"/>
   </p:sldIdLst>
   <p:sldSz cx="12192000" cy="6858000"/>
   <p:notesSz cx="6858000" cy="9144000"/>
@@ -206,7 +207,7 @@
           </a:lstStyle>
           <a:p>
             <a:fld id="{B35BE548-DE05-8149-9395-93E03CC73C13}" type="datetimeFigureOut">
-              <a:t>14.06.23</a:t>
+              <a:t>04.10.23</a:t>
             </a:fld>
             <a:endParaRPr lang="de-DE"/>
           </a:p>
@@ -640,6 +641,90 @@
 </p:notes>
 </file>
 
+<file path=ppt/notesSlides/notesSlide11.xml><?xml version="1.0" encoding="utf-8"?>
+<p:notes xmlns:a="http://schemas.openxmlformats.org/drawingml/2006/main" xmlns:r="http://schemas.openxmlformats.org/officeDocument/2006/relationships" xmlns:p="http://schemas.openxmlformats.org/presentationml/2006/main">
+  <p:cSld>
+    <p:spTree>
+      <p:nvGrpSpPr>
+        <p:cNvPr id="1" name=""/>
+        <p:cNvGrpSpPr/>
+        <p:nvPr/>
+      </p:nvGrpSpPr>
+      <p:grpSpPr>
+        <a:xfrm>
+          <a:off x="0" y="0"/>
+          <a:ext cx="0" cy="0"/>
+          <a:chOff x="0" y="0"/>
+          <a:chExt cx="0" cy="0"/>
+        </a:xfrm>
+      </p:grpSpPr>
+      <p:sp>
+        <p:nvSpPr>
+          <p:cNvPr id="2" name="Folienbildplatzhalter 1"/>
+          <p:cNvSpPr>
+            <a:spLocks noGrp="1" noRot="1" noChangeAspect="1"/>
+          </p:cNvSpPr>
+          <p:nvPr>
+            <p:ph type="sldImg"/>
+          </p:nvPr>
+        </p:nvSpPr>
+        <p:spPr/>
+      </p:sp>
+      <p:sp>
+        <p:nvSpPr>
+          <p:cNvPr id="3" name="Notizenplatzhalter 2"/>
+          <p:cNvSpPr>
+            <a:spLocks noGrp="1"/>
+          </p:cNvSpPr>
+          <p:nvPr>
+            <p:ph type="body" idx="1"/>
+          </p:nvPr>
+        </p:nvSpPr>
+        <p:spPr/>
+        <p:txBody>
+          <a:bodyPr/>
+          <a:lstStyle/>
+          <a:p>
+            <a:endParaRPr lang="de-DE"/>
+          </a:p>
+        </p:txBody>
+      </p:sp>
+      <p:sp>
+        <p:nvSpPr>
+          <p:cNvPr id="4" name="Foliennummernplatzhalter 3"/>
+          <p:cNvSpPr>
+            <a:spLocks noGrp="1"/>
+          </p:cNvSpPr>
+          <p:nvPr>
+            <p:ph type="sldNum" sz="quarter" idx="5"/>
+          </p:nvPr>
+        </p:nvSpPr>
+        <p:spPr/>
+        <p:txBody>
+          <a:bodyPr/>
+          <a:lstStyle/>
+          <a:p>
+            <a:fld id="{8676B46A-5025-BA4D-A49D-5D1F5DB78F39}" type="slidenum">
+              <a:rPr lang="de-DE"/>
+              <a:t>12</a:t>
+            </a:fld>
+            <a:endParaRPr lang="de-DE"/>
+          </a:p>
+        </p:txBody>
+      </p:sp>
+    </p:spTree>
+    <p:extLst>
+      <p:ext uri="{BB962C8B-B14F-4D97-AF65-F5344CB8AC3E}">
+        <p14:creationId xmlns:p14="http://schemas.microsoft.com/office/powerpoint/2010/main" val="3014416448"/>
+      </p:ext>
+    </p:extLst>
+  </p:cSld>
+  <p:clrMapOvr>
+    <a:masterClrMapping/>
+  </p:clrMapOvr>
+</p:notes>
+</file>
+
 <file path=ppt/notesSlides/notesSlide2.xml><?xml version="1.0" encoding="utf-8"?>
 <p:notes xmlns:a="http://schemas.openxmlformats.org/drawingml/2006/main" xmlns:r="http://schemas.openxmlformats.org/officeDocument/2006/relationships" xmlns:p="http://schemas.openxmlformats.org/presentationml/2006/main">
   <p:cSld>
@@ -1458,7 +1543,7 @@
           <a:lstStyle/>
           <a:p>
             <a:fld id="{F7A3446A-3617-0E4A-A439-6DD0C73FFDE1}" type="datetimeFigureOut">
-              <a:t>14.06.23</a:t>
+              <a:t>04.10.23</a:t>
             </a:fld>
             <a:endParaRPr lang="de-DE"/>
           </a:p>
@@ -1654,7 +1739,7 @@
           <a:lstStyle/>
           <a:p>
             <a:fld id="{F7A3446A-3617-0E4A-A439-6DD0C73FFDE1}" type="datetimeFigureOut">
-              <a:t>14.06.23</a:t>
+              <a:t>04.10.23</a:t>
             </a:fld>
             <a:endParaRPr lang="de-DE"/>
           </a:p>
@@ -1860,7 +1945,7 @@
           <a:lstStyle/>
           <a:p>
             <a:fld id="{F7A3446A-3617-0E4A-A439-6DD0C73FFDE1}" type="datetimeFigureOut">
-              <a:t>14.06.23</a:t>
+              <a:t>04.10.23</a:t>
             </a:fld>
             <a:endParaRPr lang="de-DE"/>
           </a:p>
@@ -2056,7 +2141,7 @@
           <a:lstStyle/>
           <a:p>
             <a:fld id="{F7A3446A-3617-0E4A-A439-6DD0C73FFDE1}" type="datetimeFigureOut">
-              <a:t>14.06.23</a:t>
+              <a:t>04.10.23</a:t>
             </a:fld>
             <a:endParaRPr lang="de-DE"/>
           </a:p>
@@ -2329,7 +2414,7 @@
           <a:lstStyle/>
           <a:p>
             <a:fld id="{F7A3446A-3617-0E4A-A439-6DD0C73FFDE1}" type="datetimeFigureOut">
-              <a:t>14.06.23</a:t>
+              <a:t>04.10.23</a:t>
             </a:fld>
             <a:endParaRPr lang="de-DE"/>
           </a:p>
@@ -2592,7 +2677,7 @@
           <a:lstStyle/>
           <a:p>
             <a:fld id="{F7A3446A-3617-0E4A-A439-6DD0C73FFDE1}" type="datetimeFigureOut">
-              <a:t>14.06.23</a:t>
+              <a:t>04.10.23</a:t>
             </a:fld>
             <a:endParaRPr lang="de-DE"/>
           </a:p>
@@ -3002,7 +3087,7 @@
           <a:lstStyle/>
           <a:p>
             <a:fld id="{F7A3446A-3617-0E4A-A439-6DD0C73FFDE1}" type="datetimeFigureOut">
-              <a:t>14.06.23</a:t>
+              <a:t>04.10.23</a:t>
             </a:fld>
             <a:endParaRPr lang="de-DE"/>
           </a:p>
@@ -3141,7 +3226,7 @@
           <a:lstStyle/>
           <a:p>
             <a:fld id="{F7A3446A-3617-0E4A-A439-6DD0C73FFDE1}" type="datetimeFigureOut">
-              <a:t>14.06.23</a:t>
+              <a:t>04.10.23</a:t>
             </a:fld>
             <a:endParaRPr lang="de-DE"/>
           </a:p>
@@ -3252,7 +3337,7 @@
           <a:lstStyle/>
           <a:p>
             <a:fld id="{F7A3446A-3617-0E4A-A439-6DD0C73FFDE1}" type="datetimeFigureOut">
-              <a:t>14.06.23</a:t>
+              <a:t>04.10.23</a:t>
             </a:fld>
             <a:endParaRPr lang="de-DE"/>
           </a:p>
@@ -3561,7 +3646,7 @@
           <a:lstStyle/>
           <a:p>
             <a:fld id="{F7A3446A-3617-0E4A-A439-6DD0C73FFDE1}" type="datetimeFigureOut">
-              <a:t>14.06.23</a:t>
+              <a:t>04.10.23</a:t>
             </a:fld>
             <a:endParaRPr lang="de-DE"/>
           </a:p>
@@ -3847,7 +3932,7 @@
           <a:lstStyle/>
           <a:p>
             <a:fld id="{F7A3446A-3617-0E4A-A439-6DD0C73FFDE1}" type="datetimeFigureOut">
-              <a:t>14.06.23</a:t>
+              <a:t>04.10.23</a:t>
             </a:fld>
             <a:endParaRPr lang="de-DE"/>
           </a:p>
@@ -4086,7 +4171,7 @@
           </a:lstStyle>
           <a:p>
             <a:fld id="{F7A3446A-3617-0E4A-A439-6DD0C73FFDE1}" type="datetimeFigureOut">
-              <a:t>14.06.23</a:t>
+              <a:t>04.10.23</a:t>
             </a:fld>
             <a:endParaRPr lang="de-DE"/>
           </a:p>
@@ -5984,6 +6069,778 @@
     <p:extLst>
       <p:ext uri="{BB962C8B-B14F-4D97-AF65-F5344CB8AC3E}">
         <p14:creationId xmlns:p14="http://schemas.microsoft.com/office/powerpoint/2010/main" val="3227484714"/>
+      </p:ext>
+    </p:extLst>
+  </p:cSld>
+  <p:clrMapOvr>
+    <a:masterClrMapping/>
+  </p:clrMapOvr>
+</p:sld>
+</file>
+
+<file path=ppt/slides/slide12.xml><?xml version="1.0" encoding="utf-8"?>
+<p:sld xmlns:a="http://schemas.openxmlformats.org/drawingml/2006/main" xmlns:r="http://schemas.openxmlformats.org/officeDocument/2006/relationships" xmlns:p="http://schemas.openxmlformats.org/presentationml/2006/main">
+  <p:cSld>
+    <p:spTree>
+      <p:nvGrpSpPr>
+        <p:cNvPr id="1" name=""/>
+        <p:cNvGrpSpPr/>
+        <p:nvPr/>
+      </p:nvGrpSpPr>
+      <p:grpSpPr>
+        <a:xfrm>
+          <a:off x="0" y="0"/>
+          <a:ext cx="0" cy="0"/>
+          <a:chOff x="0" y="0"/>
+          <a:chExt cx="0" cy="0"/>
+        </a:xfrm>
+      </p:grpSpPr>
+      <p:pic>
+        <p:nvPicPr>
+          <p:cNvPr id="5" name="Grafik 4">
+            <a:extLst>
+              <a:ext uri="{FF2B5EF4-FFF2-40B4-BE49-F238E27FC236}">
+                <a16:creationId xmlns:a16="http://schemas.microsoft.com/office/drawing/2014/main" id="{7CB0C9F3-9194-2081-1CA3-5700AB15AB75}"/>
+              </a:ext>
+            </a:extLst>
+          </p:cNvPr>
+          <p:cNvPicPr>
+            <a:picLocks noChangeAspect="1"/>
+          </p:cNvPicPr>
+          <p:nvPr/>
+        </p:nvPicPr>
+        <p:blipFill>
+          <a:blip r:embed="rId3"/>
+          <a:stretch>
+            <a:fillRect/>
+          </a:stretch>
+        </p:blipFill>
+        <p:spPr>
+          <a:xfrm>
+            <a:off x="34958" y="1610946"/>
+            <a:ext cx="3137838" cy="1548000"/>
+          </a:xfrm>
+          <a:prstGeom prst="rect">
+            <a:avLst/>
+          </a:prstGeom>
+        </p:spPr>
+      </p:pic>
+      <p:pic>
+        <p:nvPicPr>
+          <p:cNvPr id="7" name="Grafik 6">
+            <a:extLst>
+              <a:ext uri="{FF2B5EF4-FFF2-40B4-BE49-F238E27FC236}">
+                <a16:creationId xmlns:a16="http://schemas.microsoft.com/office/drawing/2014/main" id="{6249975B-EC28-27DE-1689-E985EBF836D1}"/>
+              </a:ext>
+            </a:extLst>
+          </p:cNvPr>
+          <p:cNvPicPr>
+            <a:picLocks noChangeAspect="1"/>
+          </p:cNvPicPr>
+          <p:nvPr/>
+        </p:nvPicPr>
+        <p:blipFill>
+          <a:blip r:embed="rId4"/>
+          <a:stretch>
+            <a:fillRect/>
+          </a:stretch>
+        </p:blipFill>
+        <p:spPr>
+          <a:xfrm>
+            <a:off x="34958" y="3281788"/>
+            <a:ext cx="3137838" cy="1548000"/>
+          </a:xfrm>
+          <a:prstGeom prst="rect">
+            <a:avLst/>
+          </a:prstGeom>
+        </p:spPr>
+      </p:pic>
+      <p:pic>
+        <p:nvPicPr>
+          <p:cNvPr id="8" name="Grafik 7">
+            <a:extLst>
+              <a:ext uri="{FF2B5EF4-FFF2-40B4-BE49-F238E27FC236}">
+                <a16:creationId xmlns:a16="http://schemas.microsoft.com/office/drawing/2014/main" id="{174345FE-D6E1-E5BE-2102-A5BCDABD4394}"/>
+              </a:ext>
+            </a:extLst>
+          </p:cNvPr>
+          <p:cNvPicPr>
+            <a:picLocks noChangeAspect="1"/>
+          </p:cNvPicPr>
+          <p:nvPr/>
+        </p:nvPicPr>
+        <p:blipFill>
+          <a:blip r:embed="rId5"/>
+          <a:stretch>
+            <a:fillRect/>
+          </a:stretch>
+        </p:blipFill>
+        <p:spPr>
+          <a:xfrm>
+            <a:off x="38956" y="4952630"/>
+            <a:ext cx="3139200" cy="1841664"/>
+          </a:xfrm>
+          <a:prstGeom prst="rect">
+            <a:avLst/>
+          </a:prstGeom>
+        </p:spPr>
+      </p:pic>
+      <p:pic>
+        <p:nvPicPr>
+          <p:cNvPr id="9" name="Grafik 8">
+            <a:extLst>
+              <a:ext uri="{FF2B5EF4-FFF2-40B4-BE49-F238E27FC236}">
+                <a16:creationId xmlns:a16="http://schemas.microsoft.com/office/drawing/2014/main" id="{40C54A0B-35B3-8308-9B41-684F4885121A}"/>
+              </a:ext>
+            </a:extLst>
+          </p:cNvPr>
+          <p:cNvPicPr>
+            <a:picLocks noChangeAspect="1"/>
+          </p:cNvPicPr>
+          <p:nvPr/>
+        </p:nvPicPr>
+        <p:blipFill>
+          <a:blip r:embed="rId6"/>
+          <a:stretch>
+            <a:fillRect/>
+          </a:stretch>
+        </p:blipFill>
+        <p:spPr>
+          <a:xfrm>
+            <a:off x="3378491" y="1610946"/>
+            <a:ext cx="3387290" cy="1548000"/>
+          </a:xfrm>
+          <a:prstGeom prst="rect">
+            <a:avLst/>
+          </a:prstGeom>
+        </p:spPr>
+      </p:pic>
+      <p:pic>
+        <p:nvPicPr>
+          <p:cNvPr id="10" name="Grafik 9">
+            <a:extLst>
+              <a:ext uri="{FF2B5EF4-FFF2-40B4-BE49-F238E27FC236}">
+                <a16:creationId xmlns:a16="http://schemas.microsoft.com/office/drawing/2014/main" id="{8DB35598-ED93-7E35-201A-9FDACCAE2B13}"/>
+              </a:ext>
+            </a:extLst>
+          </p:cNvPr>
+          <p:cNvPicPr>
+            <a:picLocks noChangeAspect="1"/>
+          </p:cNvPicPr>
+          <p:nvPr/>
+        </p:nvPicPr>
+        <p:blipFill>
+          <a:blip r:embed="rId7"/>
+          <a:stretch>
+            <a:fillRect/>
+          </a:stretch>
+        </p:blipFill>
+        <p:spPr>
+          <a:xfrm>
+            <a:off x="3378491" y="3281788"/>
+            <a:ext cx="3387290" cy="1548000"/>
+          </a:xfrm>
+          <a:prstGeom prst="rect">
+            <a:avLst/>
+          </a:prstGeom>
+        </p:spPr>
+      </p:pic>
+      <p:pic>
+        <p:nvPicPr>
+          <p:cNvPr id="13" name="Grafik 12">
+            <a:extLst>
+              <a:ext uri="{FF2B5EF4-FFF2-40B4-BE49-F238E27FC236}">
+                <a16:creationId xmlns:a16="http://schemas.microsoft.com/office/drawing/2014/main" id="{736C017E-A1FA-C756-E235-C89F8CD39F3A}"/>
+              </a:ext>
+            </a:extLst>
+          </p:cNvPr>
+          <p:cNvPicPr>
+            <a:picLocks noChangeAspect="1"/>
+          </p:cNvPicPr>
+          <p:nvPr/>
+        </p:nvPicPr>
+        <p:blipFill>
+          <a:blip r:embed="rId8"/>
+          <a:stretch>
+            <a:fillRect/>
+          </a:stretch>
+        </p:blipFill>
+        <p:spPr>
+          <a:xfrm>
+            <a:off x="3384580" y="4952630"/>
+            <a:ext cx="3394800" cy="1818344"/>
+          </a:xfrm>
+          <a:prstGeom prst="rect">
+            <a:avLst/>
+          </a:prstGeom>
+        </p:spPr>
+      </p:pic>
+      <p:sp>
+        <p:nvSpPr>
+          <p:cNvPr id="11" name="Rechteck 10">
+            <a:extLst>
+              <a:ext uri="{FF2B5EF4-FFF2-40B4-BE49-F238E27FC236}">
+                <a16:creationId xmlns:a16="http://schemas.microsoft.com/office/drawing/2014/main" id="{44994101-61C3-742A-9066-8520EBDD30B5}"/>
+              </a:ext>
+            </a:extLst>
+          </p:cNvPr>
+          <p:cNvSpPr/>
+          <p:nvPr/>
+        </p:nvSpPr>
+        <p:spPr>
+          <a:xfrm>
+            <a:off x="2795862" y="1781126"/>
+            <a:ext cx="360000" cy="360000"/>
+          </a:xfrm>
+          <a:prstGeom prst="rect">
+            <a:avLst/>
+          </a:prstGeom>
+          <a:solidFill>
+            <a:schemeClr val="bg2"/>
+          </a:solidFill>
+          <a:ln>
+            <a:noFill/>
+          </a:ln>
+        </p:spPr>
+        <p:style>
+          <a:lnRef idx="2">
+            <a:schemeClr val="accent1">
+              <a:shade val="50000"/>
+            </a:schemeClr>
+          </a:lnRef>
+          <a:fillRef idx="1">
+            <a:schemeClr val="accent1"/>
+          </a:fillRef>
+          <a:effectRef idx="0">
+            <a:schemeClr val="accent1"/>
+          </a:effectRef>
+          <a:fontRef idx="minor">
+            <a:schemeClr val="lt1"/>
+          </a:fontRef>
+        </p:style>
+        <p:txBody>
+          <a:bodyPr rtlCol="0" anchor="ctr"/>
+          <a:lstStyle/>
+          <a:p>
+            <a:pPr algn="ctr"/>
+            <a:r>
+              <a:rPr lang="de-DE" sz="2000" b="1">
+                <a:solidFill>
+                  <a:schemeClr val="tx1"/>
+                </a:solidFill>
+              </a:rPr>
+              <a:t>B</a:t>
+            </a:r>
+          </a:p>
+        </p:txBody>
+      </p:sp>
+      <p:sp>
+        <p:nvSpPr>
+          <p:cNvPr id="12" name="Rechteck 11">
+            <a:extLst>
+              <a:ext uri="{FF2B5EF4-FFF2-40B4-BE49-F238E27FC236}">
+                <a16:creationId xmlns:a16="http://schemas.microsoft.com/office/drawing/2014/main" id="{0EA071AE-534C-12DB-7B78-253852C24C6C}"/>
+              </a:ext>
+            </a:extLst>
+          </p:cNvPr>
+          <p:cNvSpPr/>
+          <p:nvPr/>
+        </p:nvSpPr>
+        <p:spPr>
+          <a:xfrm>
+            <a:off x="5747237" y="1773336"/>
+            <a:ext cx="360000" cy="360000"/>
+          </a:xfrm>
+          <a:prstGeom prst="rect">
+            <a:avLst/>
+          </a:prstGeom>
+          <a:solidFill>
+            <a:schemeClr val="bg2"/>
+          </a:solidFill>
+          <a:ln>
+            <a:noFill/>
+          </a:ln>
+        </p:spPr>
+        <p:style>
+          <a:lnRef idx="2">
+            <a:schemeClr val="accent1">
+              <a:shade val="50000"/>
+            </a:schemeClr>
+          </a:lnRef>
+          <a:fillRef idx="1">
+            <a:schemeClr val="accent1"/>
+          </a:fillRef>
+          <a:effectRef idx="0">
+            <a:schemeClr val="accent1"/>
+          </a:effectRef>
+          <a:fontRef idx="minor">
+            <a:schemeClr val="lt1"/>
+          </a:fontRef>
+        </p:style>
+        <p:txBody>
+          <a:bodyPr rtlCol="0" anchor="ctr"/>
+          <a:lstStyle/>
+          <a:p>
+            <a:pPr algn="ctr"/>
+            <a:r>
+              <a:rPr lang="de-DE" sz="2000" b="1">
+                <a:solidFill>
+                  <a:schemeClr val="tx1"/>
+                </a:solidFill>
+              </a:rPr>
+              <a:t>C</a:t>
+            </a:r>
+          </a:p>
+        </p:txBody>
+      </p:sp>
+      <p:sp>
+        <p:nvSpPr>
+          <p:cNvPr id="14" name="Rechteck 13">
+            <a:extLst>
+              <a:ext uri="{FF2B5EF4-FFF2-40B4-BE49-F238E27FC236}">
+                <a16:creationId xmlns:a16="http://schemas.microsoft.com/office/drawing/2014/main" id="{A2A80FEA-9EFE-3462-06E6-AEBEE3DFDC9E}"/>
+              </a:ext>
+            </a:extLst>
+          </p:cNvPr>
+          <p:cNvSpPr/>
+          <p:nvPr/>
+        </p:nvSpPr>
+        <p:spPr>
+          <a:xfrm>
+            <a:off x="2787394" y="3444260"/>
+            <a:ext cx="360000" cy="360000"/>
+          </a:xfrm>
+          <a:prstGeom prst="rect">
+            <a:avLst/>
+          </a:prstGeom>
+          <a:solidFill>
+            <a:schemeClr val="bg2"/>
+          </a:solidFill>
+          <a:ln>
+            <a:noFill/>
+          </a:ln>
+        </p:spPr>
+        <p:style>
+          <a:lnRef idx="2">
+            <a:schemeClr val="accent1">
+              <a:shade val="50000"/>
+            </a:schemeClr>
+          </a:lnRef>
+          <a:fillRef idx="1">
+            <a:schemeClr val="accent1"/>
+          </a:fillRef>
+          <a:effectRef idx="0">
+            <a:schemeClr val="accent1"/>
+          </a:effectRef>
+          <a:fontRef idx="minor">
+            <a:schemeClr val="lt1"/>
+          </a:fontRef>
+        </p:style>
+        <p:txBody>
+          <a:bodyPr rtlCol="0" anchor="ctr"/>
+          <a:lstStyle/>
+          <a:p>
+            <a:pPr algn="ctr"/>
+            <a:r>
+              <a:rPr lang="de-DE" sz="2000" b="1">
+                <a:solidFill>
+                  <a:schemeClr val="tx1"/>
+                </a:solidFill>
+              </a:rPr>
+              <a:t>D</a:t>
+            </a:r>
+          </a:p>
+        </p:txBody>
+      </p:sp>
+      <p:sp>
+        <p:nvSpPr>
+          <p:cNvPr id="15" name="Rechteck 14">
+            <a:extLst>
+              <a:ext uri="{FF2B5EF4-FFF2-40B4-BE49-F238E27FC236}">
+                <a16:creationId xmlns:a16="http://schemas.microsoft.com/office/drawing/2014/main" id="{8BA8B8E6-748E-F164-89E4-A239FCC0E026}"/>
+              </a:ext>
+            </a:extLst>
+          </p:cNvPr>
+          <p:cNvSpPr/>
+          <p:nvPr/>
+        </p:nvSpPr>
+        <p:spPr>
+          <a:xfrm>
+            <a:off x="5745053" y="3444264"/>
+            <a:ext cx="360000" cy="360000"/>
+          </a:xfrm>
+          <a:prstGeom prst="rect">
+            <a:avLst/>
+          </a:prstGeom>
+          <a:solidFill>
+            <a:schemeClr val="bg2"/>
+          </a:solidFill>
+          <a:ln>
+            <a:noFill/>
+          </a:ln>
+        </p:spPr>
+        <p:style>
+          <a:lnRef idx="2">
+            <a:schemeClr val="accent1">
+              <a:shade val="50000"/>
+            </a:schemeClr>
+          </a:lnRef>
+          <a:fillRef idx="1">
+            <a:schemeClr val="accent1"/>
+          </a:fillRef>
+          <a:effectRef idx="0">
+            <a:schemeClr val="accent1"/>
+          </a:effectRef>
+          <a:fontRef idx="minor">
+            <a:schemeClr val="lt1"/>
+          </a:fontRef>
+        </p:style>
+        <p:txBody>
+          <a:bodyPr rtlCol="0" anchor="ctr"/>
+          <a:lstStyle/>
+          <a:p>
+            <a:pPr algn="ctr"/>
+            <a:r>
+              <a:rPr lang="de-DE" sz="2000" b="1">
+                <a:solidFill>
+                  <a:schemeClr val="tx1"/>
+                </a:solidFill>
+              </a:rPr>
+              <a:t>E</a:t>
+            </a:r>
+          </a:p>
+        </p:txBody>
+      </p:sp>
+      <p:sp>
+        <p:nvSpPr>
+          <p:cNvPr id="16" name="Rechteck 15">
+            <a:extLst>
+              <a:ext uri="{FF2B5EF4-FFF2-40B4-BE49-F238E27FC236}">
+                <a16:creationId xmlns:a16="http://schemas.microsoft.com/office/drawing/2014/main" id="{F96BAF00-E597-4C76-109E-3AE21C9AECF0}"/>
+              </a:ext>
+            </a:extLst>
+          </p:cNvPr>
+          <p:cNvSpPr/>
+          <p:nvPr/>
+        </p:nvSpPr>
+        <p:spPr>
+          <a:xfrm>
+            <a:off x="2787395" y="5110110"/>
+            <a:ext cx="360000" cy="360000"/>
+          </a:xfrm>
+          <a:prstGeom prst="rect">
+            <a:avLst/>
+          </a:prstGeom>
+          <a:solidFill>
+            <a:schemeClr val="bg2"/>
+          </a:solidFill>
+          <a:ln>
+            <a:noFill/>
+          </a:ln>
+        </p:spPr>
+        <p:style>
+          <a:lnRef idx="2">
+            <a:schemeClr val="accent1">
+              <a:shade val="50000"/>
+            </a:schemeClr>
+          </a:lnRef>
+          <a:fillRef idx="1">
+            <a:schemeClr val="accent1"/>
+          </a:fillRef>
+          <a:effectRef idx="0">
+            <a:schemeClr val="accent1"/>
+          </a:effectRef>
+          <a:fontRef idx="minor">
+            <a:schemeClr val="lt1"/>
+          </a:fontRef>
+        </p:style>
+        <p:txBody>
+          <a:bodyPr rtlCol="0" anchor="ctr"/>
+          <a:lstStyle/>
+          <a:p>
+            <a:pPr algn="ctr"/>
+            <a:r>
+              <a:rPr lang="de-DE" sz="2000" b="1">
+                <a:solidFill>
+                  <a:schemeClr val="tx1"/>
+                </a:solidFill>
+              </a:rPr>
+              <a:t>F</a:t>
+            </a:r>
+          </a:p>
+        </p:txBody>
+      </p:sp>
+      <p:sp>
+        <p:nvSpPr>
+          <p:cNvPr id="17" name="Rechteck 16">
+            <a:extLst>
+              <a:ext uri="{FF2B5EF4-FFF2-40B4-BE49-F238E27FC236}">
+                <a16:creationId xmlns:a16="http://schemas.microsoft.com/office/drawing/2014/main" id="{CF260528-65C8-1781-3362-195903686F4B}"/>
+              </a:ext>
+            </a:extLst>
+          </p:cNvPr>
+          <p:cNvSpPr/>
+          <p:nvPr/>
+        </p:nvSpPr>
+        <p:spPr>
+          <a:xfrm>
+            <a:off x="5770453" y="5101644"/>
+            <a:ext cx="360000" cy="360000"/>
+          </a:xfrm>
+          <a:prstGeom prst="rect">
+            <a:avLst/>
+          </a:prstGeom>
+          <a:solidFill>
+            <a:schemeClr val="bg2"/>
+          </a:solidFill>
+          <a:ln>
+            <a:noFill/>
+          </a:ln>
+        </p:spPr>
+        <p:style>
+          <a:lnRef idx="2">
+            <a:schemeClr val="accent1">
+              <a:shade val="50000"/>
+            </a:schemeClr>
+          </a:lnRef>
+          <a:fillRef idx="1">
+            <a:schemeClr val="accent1"/>
+          </a:fillRef>
+          <a:effectRef idx="0">
+            <a:schemeClr val="accent1"/>
+          </a:effectRef>
+          <a:fontRef idx="minor">
+            <a:schemeClr val="lt1"/>
+          </a:fontRef>
+        </p:style>
+        <p:txBody>
+          <a:bodyPr rtlCol="0" anchor="ctr"/>
+          <a:lstStyle/>
+          <a:p>
+            <a:pPr algn="ctr"/>
+            <a:r>
+              <a:rPr lang="de-DE" sz="2000" b="1">
+                <a:solidFill>
+                  <a:schemeClr val="tx1"/>
+                </a:solidFill>
+              </a:rPr>
+              <a:t>G</a:t>
+            </a:r>
+          </a:p>
+        </p:txBody>
+      </p:sp>
+      <p:cxnSp>
+        <p:nvCxnSpPr>
+          <p:cNvPr id="20" name="Gerade Verbindung 19">
+            <a:extLst>
+              <a:ext uri="{FF2B5EF4-FFF2-40B4-BE49-F238E27FC236}">
+                <a16:creationId xmlns:a16="http://schemas.microsoft.com/office/drawing/2014/main" id="{4CDE1E87-D42B-90A6-E8A5-5B3D0E804E83}"/>
+              </a:ext>
+            </a:extLst>
+          </p:cNvPr>
+          <p:cNvCxnSpPr>
+            <a:cxnSpLocks/>
+          </p:cNvCxnSpPr>
+          <p:nvPr/>
+        </p:nvCxnSpPr>
+        <p:spPr>
+          <a:xfrm flipV="1">
+            <a:off x="3284110" y="1649073"/>
+            <a:ext cx="0" cy="4696061"/>
+          </a:xfrm>
+          <a:prstGeom prst="line">
+            <a:avLst/>
+          </a:prstGeom>
+          <a:ln w="12700">
+            <a:solidFill>
+              <a:schemeClr val="tx1"/>
+            </a:solidFill>
+            <a:prstDash val="dash"/>
+          </a:ln>
+        </p:spPr>
+        <p:style>
+          <a:lnRef idx="1">
+            <a:schemeClr val="accent1"/>
+          </a:lnRef>
+          <a:fillRef idx="0">
+            <a:schemeClr val="accent1"/>
+          </a:fillRef>
+          <a:effectRef idx="0">
+            <a:schemeClr val="accent1"/>
+          </a:effectRef>
+          <a:fontRef idx="minor">
+            <a:schemeClr val="tx1"/>
+          </a:fontRef>
+        </p:style>
+      </p:cxnSp>
+      <p:pic>
+        <p:nvPicPr>
+          <p:cNvPr id="30" name="Grafik 29">
+            <a:extLst>
+              <a:ext uri="{FF2B5EF4-FFF2-40B4-BE49-F238E27FC236}">
+                <a16:creationId xmlns:a16="http://schemas.microsoft.com/office/drawing/2014/main" id="{22D09A14-24E5-F7B8-24A6-686695A2B38C}"/>
+              </a:ext>
+            </a:extLst>
+          </p:cNvPr>
+          <p:cNvPicPr>
+            <a:picLocks noChangeAspect="1"/>
+          </p:cNvPicPr>
+          <p:nvPr/>
+        </p:nvPicPr>
+        <p:blipFill>
+          <a:blip r:embed="rId9"/>
+          <a:stretch>
+            <a:fillRect/>
+          </a:stretch>
+        </p:blipFill>
+        <p:spPr>
+          <a:xfrm>
+            <a:off x="1513923" y="8760"/>
+            <a:ext cx="3758248" cy="1548000"/>
+          </a:xfrm>
+          <a:prstGeom prst="rect">
+            <a:avLst/>
+          </a:prstGeom>
+        </p:spPr>
+      </p:pic>
+      <p:sp>
+        <p:nvSpPr>
+          <p:cNvPr id="6" name="Rechteck 5">
+            <a:extLst>
+              <a:ext uri="{FF2B5EF4-FFF2-40B4-BE49-F238E27FC236}">
+                <a16:creationId xmlns:a16="http://schemas.microsoft.com/office/drawing/2014/main" id="{E2248A96-BA01-9896-8B41-21A2BBC33101}"/>
+              </a:ext>
+            </a:extLst>
+          </p:cNvPr>
+          <p:cNvSpPr/>
+          <p:nvPr/>
+        </p:nvSpPr>
+        <p:spPr>
+          <a:xfrm>
+            <a:off x="4246493" y="172163"/>
+            <a:ext cx="360000" cy="360000"/>
+          </a:xfrm>
+          <a:prstGeom prst="rect">
+            <a:avLst/>
+          </a:prstGeom>
+          <a:solidFill>
+            <a:schemeClr val="bg2"/>
+          </a:solidFill>
+          <a:ln>
+            <a:noFill/>
+          </a:ln>
+        </p:spPr>
+        <p:style>
+          <a:lnRef idx="2">
+            <a:schemeClr val="accent1">
+              <a:shade val="50000"/>
+            </a:schemeClr>
+          </a:lnRef>
+          <a:fillRef idx="1">
+            <a:schemeClr val="accent1"/>
+          </a:fillRef>
+          <a:effectRef idx="0">
+            <a:schemeClr val="accent1"/>
+          </a:effectRef>
+          <a:fontRef idx="minor">
+            <a:schemeClr val="lt1"/>
+          </a:fontRef>
+        </p:style>
+        <p:txBody>
+          <a:bodyPr rtlCol="0" anchor="ctr"/>
+          <a:lstStyle/>
+          <a:p>
+            <a:pPr algn="ctr"/>
+            <a:r>
+              <a:rPr lang="de-DE" sz="2000" b="1">
+                <a:solidFill>
+                  <a:schemeClr val="tx1"/>
+                </a:solidFill>
+              </a:rPr>
+              <a:t>A</a:t>
+            </a:r>
+          </a:p>
+        </p:txBody>
+      </p:sp>
+      <p:pic>
+        <p:nvPicPr>
+          <p:cNvPr id="2" name="Grafik 1">
+            <a:extLst>
+              <a:ext uri="{FF2B5EF4-FFF2-40B4-BE49-F238E27FC236}">
+                <a16:creationId xmlns:a16="http://schemas.microsoft.com/office/drawing/2014/main" id="{898D025C-D70B-6394-03E5-EAC9E5236AC0}"/>
+              </a:ext>
+            </a:extLst>
+          </p:cNvPr>
+          <p:cNvPicPr>
+            <a:picLocks noChangeAspect="1"/>
+          </p:cNvPicPr>
+          <p:nvPr/>
+        </p:nvPicPr>
+        <p:blipFill>
+          <a:blip r:embed="rId10"/>
+          <a:stretch>
+            <a:fillRect/>
+          </a:stretch>
+        </p:blipFill>
+        <p:spPr>
+          <a:xfrm>
+            <a:off x="5132663" y="206834"/>
+            <a:ext cx="157895" cy="1238878"/>
+          </a:xfrm>
+          <a:prstGeom prst="rect">
+            <a:avLst/>
+          </a:prstGeom>
+        </p:spPr>
+      </p:pic>
+      <p:sp>
+        <p:nvSpPr>
+          <p:cNvPr id="3" name="Textfeld 2">
+            <a:extLst>
+              <a:ext uri="{FF2B5EF4-FFF2-40B4-BE49-F238E27FC236}">
+                <a16:creationId xmlns:a16="http://schemas.microsoft.com/office/drawing/2014/main" id="{6EB48ED0-D4D7-2047-78BE-3BD56210E3B4}"/>
+              </a:ext>
+            </a:extLst>
+          </p:cNvPr>
+          <p:cNvSpPr txBox="1"/>
+          <p:nvPr/>
+        </p:nvSpPr>
+        <p:spPr>
+          <a:xfrm>
+            <a:off x="7489402" y="727656"/>
+            <a:ext cx="2839792" cy="369332"/>
+          </a:xfrm>
+          <a:prstGeom prst="rect">
+            <a:avLst/>
+          </a:prstGeom>
+          <a:noFill/>
+        </p:spPr>
+        <p:txBody>
+          <a:bodyPr wrap="square" rtlCol="0">
+            <a:spAutoFit/>
+          </a:bodyPr>
+          <a:lstStyle/>
+          <a:p>
+            <a:r>
+              <a:rPr lang="de-DE">
+                <a:solidFill>
+                  <a:srgbClr val="FF0000"/>
+                </a:solidFill>
+                <a:sym typeface="Wingdings" pitchFamily="2" charset="2"/>
+              </a:rPr>
+              <a:t> correct caption</a:t>
+            </a:r>
+            <a:endParaRPr lang="de-DE">
+              <a:solidFill>
+                <a:srgbClr val="FF0000"/>
+              </a:solidFill>
+            </a:endParaRPr>
+          </a:p>
+        </p:txBody>
+      </p:sp>
+    </p:spTree>
+    <p:extLst>
+      <p:ext uri="{BB962C8B-B14F-4D97-AF65-F5344CB8AC3E}">
+        <p14:creationId xmlns:p14="http://schemas.microsoft.com/office/powerpoint/2010/main" val="1441114311"/>
       </p:ext>
     </p:extLst>
   </p:cSld>

</xml_diff>